<commit_message>
Updates to module 3 presentations.
</commit_message>
<xml_diff>
--- a/LectureFiles/cshl/2016/RNASeq_Module3_Lecture.pptx
+++ b/LectureFiles/cshl/2016/RNASeq_Module3_Lecture.pptx
@@ -5,10 +5,10 @@
     <p:sldMasterId id="2147483648" r:id="rId1"/>
   </p:sldMasterIdLst>
   <p:notesMasterIdLst>
-    <p:notesMasterId r:id="rId22"/>
+    <p:notesMasterId r:id="rId24"/>
   </p:notesMasterIdLst>
   <p:handoutMasterIdLst>
-    <p:handoutMasterId r:id="rId23"/>
+    <p:handoutMasterId r:id="rId25"/>
   </p:handoutMasterIdLst>
   <p:sldIdLst>
     <p:sldId id="341" r:id="rId2"/>
@@ -17,20 +17,22 @@
     <p:sldId id="515" r:id="rId5"/>
     <p:sldId id="516" r:id="rId6"/>
     <p:sldId id="517" r:id="rId7"/>
-    <p:sldId id="527" r:id="rId8"/>
-    <p:sldId id="529" r:id="rId9"/>
-    <p:sldId id="528" r:id="rId10"/>
-    <p:sldId id="530" r:id="rId11"/>
-    <p:sldId id="526" r:id="rId12"/>
-    <p:sldId id="525" r:id="rId13"/>
-    <p:sldId id="524" r:id="rId14"/>
-    <p:sldId id="523" r:id="rId15"/>
-    <p:sldId id="522" r:id="rId16"/>
-    <p:sldId id="521" r:id="rId17"/>
-    <p:sldId id="520" r:id="rId18"/>
-    <p:sldId id="519" r:id="rId19"/>
-    <p:sldId id="518" r:id="rId20"/>
-    <p:sldId id="512" r:id="rId21"/>
+    <p:sldId id="531" r:id="rId8"/>
+    <p:sldId id="527" r:id="rId9"/>
+    <p:sldId id="529" r:id="rId10"/>
+    <p:sldId id="532" r:id="rId11"/>
+    <p:sldId id="528" r:id="rId12"/>
+    <p:sldId id="530" r:id="rId13"/>
+    <p:sldId id="526" r:id="rId14"/>
+    <p:sldId id="525" r:id="rId15"/>
+    <p:sldId id="524" r:id="rId16"/>
+    <p:sldId id="523" r:id="rId17"/>
+    <p:sldId id="522" r:id="rId18"/>
+    <p:sldId id="521" r:id="rId19"/>
+    <p:sldId id="520" r:id="rId20"/>
+    <p:sldId id="519" r:id="rId21"/>
+    <p:sldId id="518" r:id="rId22"/>
+    <p:sldId id="512" r:id="rId23"/>
   </p:sldIdLst>
   <p:sldSz cx="9144000" cy="6858000" type="screen4x3"/>
   <p:notesSz cx="7315200" cy="9601200"/>
@@ -161,7 +163,7 @@
   </p:defaultTextStyle>
   <p:extLst>
     <p:ext uri="{EFAFB233-063F-42B5-8137-9DF3F51BA10A}">
-      <p15:sldGuideLst xmlns:p15="http://schemas.microsoft.com/office/powerpoint/2012/main" xmlns="">
+      <p15:sldGuideLst xmlns="" xmlns:p15="http://schemas.microsoft.com/office/powerpoint/2012/main">
         <p15:guide id="1" orient="horz" pos="2160">
           <p15:clr>
             <a:srgbClr val="A4A3A4"/>
@@ -281,7 +283,7 @@
               <a:pPr>
                 <a:defRPr/>
               </a:pPr>
-              <a:t>11/14/16</a:t>
+              <a:t>11/15/16</a:t>
             </a:fld>
             <a:endParaRPr lang="en-US"/>
           </a:p>
@@ -488,7 +490,7 @@
               <a:pPr>
                 <a:defRPr/>
               </a:pPr>
-              <a:t>11/14/16</a:t>
+              <a:t>11/15/16</a:t>
             </a:fld>
             <a:endParaRPr lang="en-US"/>
           </a:p>
@@ -1127,14 +1129,6 @@
           <a:bodyPr/>
           <a:lstStyle/>
           <a:p>
-            <a:r>
-              <a:rPr lang="en-US" dirty="0" smtClean="0"/>
-              <a:t>TODO: Add</a:t>
-            </a:r>
-            <a:r>
-              <a:rPr lang="en-US" baseline="0" dirty="0" smtClean="0"/>
-              <a:t> TPM</a:t>
-            </a:r>
             <a:endParaRPr lang="en-US" dirty="0"/>
           </a:p>
         </p:txBody>
@@ -1227,71 +1221,7 @@
           <a:p>
             <a:r>
               <a:rPr lang="en-US" dirty="0" smtClean="0"/>
-              <a:t>(</a:t>
-            </a:r>
-            <a:r>
-              <a:rPr lang="en-US" b="1" dirty="0" smtClean="0"/>
-              <a:t>a</a:t>
-            </a:r>
-            <a:r>
-              <a:rPr lang="en-US" dirty="0" smtClean="0"/>
-              <a:t>) Overview of the flow of the </a:t>
-            </a:r>
-            <a:r>
-              <a:rPr lang="en-US" dirty="0" err="1" smtClean="0"/>
-              <a:t>StringTie</a:t>
-            </a:r>
-            <a:r>
-              <a:rPr lang="en-US" dirty="0" smtClean="0"/>
-              <a:t> algorithm, compared to Cufflinks and </a:t>
-            </a:r>
-            <a:r>
-              <a:rPr lang="en-US" dirty="0" err="1" smtClean="0"/>
-              <a:t>Traph</a:t>
-            </a:r>
-            <a:r>
-              <a:rPr lang="en-US" dirty="0" smtClean="0"/>
-              <a:t>. All methods begin with a set of RNA-</a:t>
-            </a:r>
-            <a:r>
-              <a:rPr lang="en-US" dirty="0" err="1" smtClean="0"/>
-              <a:t>seq</a:t>
-            </a:r>
-            <a:r>
-              <a:rPr lang="en-US" dirty="0" smtClean="0"/>
-              <a:t> reads that have been mapped to the genome. An optional secondary input to </a:t>
-            </a:r>
-            <a:r>
-              <a:rPr lang="en-US" dirty="0" err="1" smtClean="0"/>
-              <a:t>StringTie</a:t>
-            </a:r>
-            <a:r>
-              <a:rPr lang="en-US" dirty="0" smtClean="0"/>
-              <a:t> is a set of pre-assembled super-reads, designated as </a:t>
-            </a:r>
-            <a:r>
-              <a:rPr lang="en-US" dirty="0" err="1" smtClean="0"/>
-              <a:t>StringTie+SR</a:t>
-            </a:r>
-            <a:r>
-              <a:rPr lang="en-US" dirty="0" smtClean="0"/>
-              <a:t>. </a:t>
-            </a:r>
-            <a:r>
-              <a:rPr lang="en-US" dirty="0" err="1" smtClean="0"/>
-              <a:t>StringTie</a:t>
-            </a:r>
-            <a:r>
-              <a:rPr lang="en-US" dirty="0" smtClean="0"/>
-              <a:t> iteratively extracts the heaviest path from a splice graph, constructs a flow network, computes maximum flow to estimate abundance, and then updates the splice graph by removing reads that were assigned by the flow algorithm. This process repeats until all reads have been assigned. (</a:t>
-            </a:r>
-            <a:r>
-              <a:rPr lang="en-US" b="1" dirty="0" smtClean="0"/>
-              <a:t>b</a:t>
-            </a:r>
-            <a:r>
-              <a:rPr lang="en-US" dirty="0" smtClean="0"/>
-              <a:t>) Annotated transcript T for which read data covers only the fragments F1 and F2. An assembler is given credit for a correct reconstruction of T if it correctly assembles F1 and F2.</a:t>
+              <a:t>When you use TPM, the sum of all TPMs in each sample are the same. This makes it easier to compare the proportion of reads that mapped to a gene in each sample. In contrast, with RPKM and FPKM, the sum of the normalized reads in each sample may be different, and this makes it harder to compare samples directly.</a:t>
             </a:r>
             <a:endParaRPr lang="en-US" dirty="0"/>
           </a:p>
@@ -1321,6 +1251,164 @@
                 <a:defRPr/>
               </a:pPr>
               <a:t>7</a:t>
+            </a:fld>
+            <a:endParaRPr lang="en-US"/>
+          </a:p>
+        </p:txBody>
+      </p:sp>
+    </p:spTree>
+    <p:extLst>
+      <p:ext uri="{BB962C8B-B14F-4D97-AF65-F5344CB8AC3E}">
+        <p14:creationId xmlns:p14="http://schemas.microsoft.com/office/powerpoint/2010/main" val="2188807247"/>
+      </p:ext>
+    </p:extLst>
+  </p:cSld>
+  <p:clrMapOvr>
+    <a:masterClrMapping/>
+  </p:clrMapOvr>
+</p:notes>
+</file>
+
+<file path=ppt/notesSlides/notesSlide4.xml><?xml version="1.0" encoding="utf-8"?>
+<p:notes xmlns:a="http://schemas.openxmlformats.org/drawingml/2006/main" xmlns:r="http://schemas.openxmlformats.org/officeDocument/2006/relationships" xmlns:p="http://schemas.openxmlformats.org/presentationml/2006/main">
+  <p:cSld>
+    <p:spTree>
+      <p:nvGrpSpPr>
+        <p:cNvPr id="1" name=""/>
+        <p:cNvGrpSpPr/>
+        <p:nvPr/>
+      </p:nvGrpSpPr>
+      <p:grpSpPr>
+        <a:xfrm>
+          <a:off x="0" y="0"/>
+          <a:ext cx="0" cy="0"/>
+          <a:chOff x="0" y="0"/>
+          <a:chExt cx="0" cy="0"/>
+        </a:xfrm>
+      </p:grpSpPr>
+      <p:sp>
+        <p:nvSpPr>
+          <p:cNvPr id="2" name="Slide Image Placeholder 1"/>
+          <p:cNvSpPr>
+            <a:spLocks noGrp="1" noRot="1" noChangeAspect="1"/>
+          </p:cNvSpPr>
+          <p:nvPr>
+            <p:ph type="sldImg"/>
+          </p:nvPr>
+        </p:nvSpPr>
+        <p:spPr/>
+      </p:sp>
+      <p:sp>
+        <p:nvSpPr>
+          <p:cNvPr id="3" name="Notes Placeholder 2"/>
+          <p:cNvSpPr>
+            <a:spLocks noGrp="1"/>
+          </p:cNvSpPr>
+          <p:nvPr>
+            <p:ph type="body" idx="1"/>
+          </p:nvPr>
+        </p:nvSpPr>
+        <p:spPr/>
+        <p:txBody>
+          <a:bodyPr/>
+          <a:lstStyle/>
+          <a:p>
+            <a:r>
+              <a:rPr lang="en-US" dirty="0" smtClean="0"/>
+              <a:t>(</a:t>
+            </a:r>
+            <a:r>
+              <a:rPr lang="en-US" b="1" dirty="0" smtClean="0"/>
+              <a:t>a</a:t>
+            </a:r>
+            <a:r>
+              <a:rPr lang="en-US" dirty="0" smtClean="0"/>
+              <a:t>) Overview of the flow of the </a:t>
+            </a:r>
+            <a:r>
+              <a:rPr lang="en-US" dirty="0" err="1" smtClean="0"/>
+              <a:t>StringTie</a:t>
+            </a:r>
+            <a:r>
+              <a:rPr lang="en-US" dirty="0" smtClean="0"/>
+              <a:t> algorithm, compared to Cufflinks and </a:t>
+            </a:r>
+            <a:r>
+              <a:rPr lang="en-US" dirty="0" err="1" smtClean="0"/>
+              <a:t>Traph</a:t>
+            </a:r>
+            <a:r>
+              <a:rPr lang="en-US" dirty="0" smtClean="0"/>
+              <a:t>. All methods begin with a set of RNA-</a:t>
+            </a:r>
+            <a:r>
+              <a:rPr lang="en-US" dirty="0" err="1" smtClean="0"/>
+              <a:t>seq</a:t>
+            </a:r>
+            <a:r>
+              <a:rPr lang="en-US" dirty="0" smtClean="0"/>
+              <a:t> reads that have been mapped to the genome. An optional secondary input to </a:t>
+            </a:r>
+            <a:r>
+              <a:rPr lang="en-US" dirty="0" err="1" smtClean="0"/>
+              <a:t>StringTie</a:t>
+            </a:r>
+            <a:r>
+              <a:rPr lang="en-US" dirty="0" smtClean="0"/>
+              <a:t> is a set of pre-assembled super-reads, designated as </a:t>
+            </a:r>
+            <a:r>
+              <a:rPr lang="en-US" dirty="0" err="1" smtClean="0"/>
+              <a:t>StringTie+SR</a:t>
+            </a:r>
+            <a:r>
+              <a:rPr lang="en-US" dirty="0" smtClean="0"/>
+              <a:t>. </a:t>
+            </a:r>
+            <a:r>
+              <a:rPr lang="en-US" dirty="0" err="1" smtClean="0"/>
+              <a:t>StringTie</a:t>
+            </a:r>
+            <a:r>
+              <a:rPr lang="en-US" dirty="0" smtClean="0"/>
+              <a:t> iteratively extracts the heaviest path from a splice graph, constructs a flow network, computes maximum flow to estimate abundance, and then updates the splice graph by removing reads that were assigned by the flow algorithm. This process repeats until all reads have been assigned. (</a:t>
+            </a:r>
+            <a:r>
+              <a:rPr lang="en-US" b="1" dirty="0" smtClean="0"/>
+              <a:t>b</a:t>
+            </a:r>
+            <a:r>
+              <a:rPr lang="en-US" dirty="0" smtClean="0"/>
+              <a:t>) Annotated transcript T for which read data covers only the fragments F1 and F2. An assembler is given credit for a correct reconstruction of T if it correctly assembles F1 and F2.</a:t>
+            </a:r>
+            <a:endParaRPr lang="en-US" dirty="0"/>
+          </a:p>
+        </p:txBody>
+      </p:sp>
+      <p:sp>
+        <p:nvSpPr>
+          <p:cNvPr id="4" name="Slide Number Placeholder 3"/>
+          <p:cNvSpPr>
+            <a:spLocks noGrp="1"/>
+          </p:cNvSpPr>
+          <p:nvPr>
+            <p:ph type="sldNum" sz="quarter" idx="10"/>
+          </p:nvPr>
+        </p:nvSpPr>
+        <p:spPr/>
+        <p:txBody>
+          <a:bodyPr/>
+          <a:lstStyle/>
+          <a:p>
+            <a:pPr>
+              <a:defRPr/>
+            </a:pPr>
+            <a:fld id="{58FBEE90-0CDA-3447-B595-4F8759630F3A}" type="slidenum">
+              <a:rPr lang="en-US" smtClean="0"/>
+              <a:pPr>
+                <a:defRPr/>
+              </a:pPr>
+              <a:t>8</a:t>
             </a:fld>
             <a:endParaRPr lang="en-US"/>
           </a:p>
@@ -3647,7 +3735,7 @@
               <a:pPr>
                 <a:defRPr/>
               </a:pPr>
-              <a:t>11/14/16</a:t>
+              <a:t>11/15/16</a:t>
             </a:fld>
             <a:endParaRPr lang="en-US"/>
           </a:p>
@@ -4401,6 +4489,384 @@
           <a:chExt cx="0" cy="0"/>
         </a:xfrm>
       </p:grpSpPr>
+      <p:sp>
+        <p:nvSpPr>
+          <p:cNvPr id="2" name="Title 1"/>
+          <p:cNvSpPr>
+            <a:spLocks noGrp="1"/>
+          </p:cNvSpPr>
+          <p:nvPr>
+            <p:ph type="title"/>
+          </p:nvPr>
+        </p:nvSpPr>
+        <p:spPr/>
+        <p:txBody>
+          <a:bodyPr/>
+          <a:lstStyle/>
+          <a:p>
+            <a:r>
+              <a:rPr lang="en-US" dirty="0" err="1" smtClean="0"/>
+              <a:t>gffcompare</a:t>
+            </a:r>
+            <a:endParaRPr lang="en-US" dirty="0"/>
+          </a:p>
+        </p:txBody>
+      </p:sp>
+      <p:sp>
+        <p:nvSpPr>
+          <p:cNvPr id="3" name="Content Placeholder 2"/>
+          <p:cNvSpPr>
+            <a:spLocks noGrp="1"/>
+          </p:cNvSpPr>
+          <p:nvPr>
+            <p:ph idx="1"/>
+          </p:nvPr>
+        </p:nvSpPr>
+        <p:spPr/>
+        <p:txBody>
+          <a:bodyPr/>
+          <a:lstStyle/>
+          <a:p>
+            <a:r>
+              <a:rPr lang="en-US" dirty="0" err="1" smtClean="0"/>
+              <a:t>gffcompare</a:t>
+            </a:r>
+            <a:r>
+              <a:rPr lang="en-US" dirty="0" smtClean="0"/>
+              <a:t> </a:t>
+            </a:r>
+            <a:r>
+              <a:rPr lang="en-US" dirty="0"/>
+              <a:t>will compare a merged transcript GTF with known annotation, also in GTF/GFF3 </a:t>
+            </a:r>
+            <a:r>
+              <a:rPr lang="en-US" dirty="0" smtClean="0"/>
+              <a:t>format</a:t>
+            </a:r>
+          </a:p>
+          <a:p>
+            <a:r>
+              <a:rPr lang="en-US" sz="1800" dirty="0">
+                <a:hlinkClick r:id="rId2"/>
+              </a:rPr>
+              <a:t>http://</a:t>
+            </a:r>
+            <a:r>
+              <a:rPr lang="en-US" sz="1800" dirty="0" err="1">
+                <a:hlinkClick r:id="rId2"/>
+              </a:rPr>
+              <a:t>cole-trapnell-lab.github.io</a:t>
+            </a:r>
+            <a:r>
+              <a:rPr lang="en-US" sz="1800" dirty="0">
+                <a:hlinkClick r:id="rId2"/>
+              </a:rPr>
+              <a:t>/cufflinks/</a:t>
+            </a:r>
+            <a:r>
+              <a:rPr lang="en-US" sz="1800" dirty="0" err="1">
+                <a:hlinkClick r:id="rId2"/>
+              </a:rPr>
+              <a:t>cuffcompare</a:t>
+            </a:r>
+            <a:r>
+              <a:rPr lang="en-US" sz="1800" dirty="0">
+                <a:hlinkClick r:id="rId2"/>
+              </a:rPr>
+              <a:t>/</a:t>
+            </a:r>
+            <a:r>
+              <a:rPr lang="en-US" sz="1800" dirty="0" err="1">
+                <a:hlinkClick r:id="rId2"/>
+              </a:rPr>
+              <a:t>index.html#cuffcompare-output-files</a:t>
+            </a:r>
+            <a:endParaRPr lang="en-US" sz="1800" dirty="0"/>
+          </a:p>
+          <a:p>
+            <a:endParaRPr lang="en-US" dirty="0"/>
+          </a:p>
+        </p:txBody>
+      </p:sp>
+      <p:pic>
+        <p:nvPicPr>
+          <p:cNvPr id="5" name="Content Placeholder 4" descr="Screen Shot 2016-11-15 at 8.31.40 AM.png"/>
+          <p:cNvPicPr>
+            <a:picLocks noGrp="1" noChangeAspect="1"/>
+          </p:cNvPicPr>
+          <p:nvPr>
+            <p:ph idx="10"/>
+          </p:nvPr>
+        </p:nvPicPr>
+        <p:blipFill>
+          <a:blip r:embed="rId3">
+            <a:extLst>
+              <a:ext uri="{28A0092B-C50C-407E-A947-70E740481C1C}">
+                <a14:useLocalDpi xmlns:a14="http://schemas.microsoft.com/office/drawing/2010/main" val="0"/>
+              </a:ext>
+            </a:extLst>
+          </a:blip>
+          <a:srcRect t="-8072" b="-8072"/>
+          <a:stretch>
+            <a:fillRect/>
+          </a:stretch>
+        </p:blipFill>
+        <p:spPr>
+          <a:xfrm>
+            <a:off x="4283968" y="1052736"/>
+            <a:ext cx="4846714" cy="5271864"/>
+          </a:xfrm>
+        </p:spPr>
+      </p:pic>
+    </p:spTree>
+    <p:extLst>
+      <p:ext uri="{BB962C8B-B14F-4D97-AF65-F5344CB8AC3E}">
+        <p14:creationId xmlns:p14="http://schemas.microsoft.com/office/powerpoint/2010/main" val="297393545"/>
+      </p:ext>
+    </p:extLst>
+  </p:cSld>
+  <p:clrMapOvr>
+    <a:masterClrMapping/>
+  </p:clrMapOvr>
+</p:sld>
+</file>
+
+<file path=ppt/slides/slide11.xml><?xml version="1.0" encoding="utf-8"?>
+<p:sld xmlns:a="http://schemas.openxmlformats.org/drawingml/2006/main" xmlns:r="http://schemas.openxmlformats.org/officeDocument/2006/relationships" xmlns:p="http://schemas.openxmlformats.org/presentationml/2006/main">
+  <p:cSld>
+    <p:spTree>
+      <p:nvGrpSpPr>
+        <p:cNvPr id="1" name=""/>
+        <p:cNvGrpSpPr/>
+        <p:nvPr/>
+      </p:nvGrpSpPr>
+      <p:grpSpPr>
+        <a:xfrm>
+          <a:off x="0" y="0"/>
+          <a:ext cx="0" cy="0"/>
+          <a:chOff x="0" y="0"/>
+          <a:chExt cx="0" cy="0"/>
+        </a:xfrm>
+      </p:grpSpPr>
+      <p:sp>
+        <p:nvSpPr>
+          <p:cNvPr id="2" name="Title 1"/>
+          <p:cNvSpPr>
+            <a:spLocks noGrp="1"/>
+          </p:cNvSpPr>
+          <p:nvPr>
+            <p:ph type="title"/>
+          </p:nvPr>
+        </p:nvSpPr>
+        <p:spPr>
+          <a:xfrm>
+            <a:off x="152400" y="0"/>
+            <a:ext cx="8839200" cy="764704"/>
+          </a:xfrm>
+        </p:spPr>
+        <p:txBody>
+          <a:bodyPr/>
+          <a:lstStyle/>
+          <a:p>
+            <a:r>
+              <a:rPr lang="en-US" dirty="0" err="1" smtClean="0"/>
+              <a:t>Ballgown</a:t>
+            </a:r>
+            <a:r>
+              <a:rPr lang="en-US" dirty="0"/>
+              <a:t> </a:t>
+            </a:r>
+            <a:r>
+              <a:rPr lang="en-US" dirty="0" smtClean="0"/>
+              <a:t>for Differential Expression</a:t>
+            </a:r>
+            <a:endParaRPr lang="en-US" dirty="0"/>
+          </a:p>
+        </p:txBody>
+      </p:sp>
+      <p:sp>
+        <p:nvSpPr>
+          <p:cNvPr id="3" name="Content Placeholder 2"/>
+          <p:cNvSpPr>
+            <a:spLocks noGrp="1"/>
+          </p:cNvSpPr>
+          <p:nvPr>
+            <p:ph idx="1"/>
+          </p:nvPr>
+        </p:nvSpPr>
+        <p:spPr>
+          <a:xfrm>
+            <a:off x="152400" y="692696"/>
+            <a:ext cx="8839200" cy="5631904"/>
+          </a:xfrm>
+        </p:spPr>
+        <p:txBody>
+          <a:bodyPr/>
+          <a:lstStyle/>
+          <a:p>
+            <a:r>
+              <a:rPr lang="en-US" dirty="0" smtClean="0"/>
+              <a:t>Parametric </a:t>
+            </a:r>
+            <a:r>
+              <a:rPr lang="en-US" dirty="0"/>
+              <a:t>F-test comparing nested linear </a:t>
+            </a:r>
+            <a:r>
+              <a:rPr lang="en-US" dirty="0" smtClean="0"/>
+              <a:t>models</a:t>
+            </a:r>
+          </a:p>
+          <a:p>
+            <a:r>
+              <a:rPr lang="en-US" dirty="0"/>
+              <a:t>Two models are fit to each feature, using expression as the </a:t>
+            </a:r>
+            <a:r>
+              <a:rPr lang="en-US" dirty="0" smtClean="0"/>
+              <a:t>outcome</a:t>
+            </a:r>
+          </a:p>
+          <a:p>
+            <a:pPr lvl="1"/>
+            <a:r>
+              <a:rPr lang="en-US" dirty="0" smtClean="0"/>
+              <a:t>one </a:t>
+            </a:r>
+            <a:r>
+              <a:rPr lang="en-US" dirty="0"/>
+              <a:t>including the covariate of interest (e.g., case/control status or time) and one not including that covariate. </a:t>
+            </a:r>
+            <a:endParaRPr lang="en-US" dirty="0" smtClean="0"/>
+          </a:p>
+          <a:p>
+            <a:r>
+              <a:rPr lang="en-US" dirty="0" smtClean="0"/>
+              <a:t>An </a:t>
+            </a:r>
+            <a:r>
+              <a:rPr lang="en-US" dirty="0"/>
+              <a:t>F statistic and p-value are calculated using the fits of the two models. </a:t>
+            </a:r>
+            <a:endParaRPr lang="en-US" dirty="0" smtClean="0"/>
+          </a:p>
+          <a:p>
+            <a:pPr lvl="1"/>
+            <a:r>
+              <a:rPr lang="en-US" dirty="0" smtClean="0"/>
+              <a:t>A </a:t>
+            </a:r>
+            <a:r>
+              <a:rPr lang="en-US" dirty="0"/>
+              <a:t>significant p-value means the model including the covariate of interest fits significantly better than the model without that covariate, indicating differential expression. </a:t>
+            </a:r>
+            <a:endParaRPr lang="en-US" dirty="0" smtClean="0"/>
+          </a:p>
+          <a:p>
+            <a:r>
+              <a:rPr lang="en-US" dirty="0" smtClean="0"/>
+              <a:t>We </a:t>
+            </a:r>
+            <a:r>
+              <a:rPr lang="en-US" dirty="0"/>
+              <a:t>adjust for multiple testing by reporting q-</a:t>
+            </a:r>
+            <a:r>
+              <a:rPr lang="en-US" dirty="0" smtClean="0"/>
+              <a:t>values: </a:t>
+            </a:r>
+          </a:p>
+          <a:p>
+            <a:pPr lvl="1"/>
+            <a:r>
+              <a:rPr lang="en-US" dirty="0" smtClean="0"/>
+              <a:t>q </a:t>
+            </a:r>
+            <a:r>
+              <a:rPr lang="en-US" dirty="0"/>
+              <a:t>&lt; </a:t>
+            </a:r>
+            <a:r>
+              <a:rPr lang="en-US" dirty="0" smtClean="0"/>
+              <a:t>0.05 </a:t>
+            </a:r>
+            <a:r>
+              <a:rPr lang="en-US" dirty="0"/>
+              <a:t>the false discovery rate should be controlled at ~</a:t>
+            </a:r>
+            <a:r>
+              <a:rPr lang="en-US" dirty="0" smtClean="0"/>
+              <a:t>5</a:t>
+            </a:r>
+            <a:r>
+              <a:rPr lang="en-US" dirty="0"/>
+              <a:t>%.</a:t>
+            </a:r>
+          </a:p>
+        </p:txBody>
+      </p:sp>
+      <p:sp>
+        <p:nvSpPr>
+          <p:cNvPr id="4" name="TextBox 3"/>
+          <p:cNvSpPr txBox="1"/>
+          <p:nvPr/>
+        </p:nvSpPr>
+        <p:spPr>
+          <a:xfrm>
+            <a:off x="6156176" y="6011996"/>
+            <a:ext cx="3024336" cy="369332"/>
+          </a:xfrm>
+          <a:prstGeom prst="rect">
+            <a:avLst/>
+          </a:prstGeom>
+          <a:noFill/>
+        </p:spPr>
+        <p:txBody>
+          <a:bodyPr wrap="square" rtlCol="0">
+            <a:spAutoFit/>
+          </a:bodyPr>
+          <a:lstStyle/>
+          <a:p>
+            <a:r>
+              <a:rPr lang="fr-FR" sz="1800" dirty="0">
+                <a:hlinkClick r:id="rId2"/>
+              </a:rPr>
+              <a:t>Frazee et al. (2014)</a:t>
+            </a:r>
+            <a:endParaRPr lang="en-US" sz="1800" dirty="0"/>
+          </a:p>
+        </p:txBody>
+      </p:sp>
+    </p:spTree>
+    <p:extLst>
+      <p:ext uri="{BB962C8B-B14F-4D97-AF65-F5344CB8AC3E}">
+        <p14:creationId xmlns:p14="http://schemas.microsoft.com/office/powerpoint/2010/main" val="2234681116"/>
+      </p:ext>
+    </p:extLst>
+  </p:cSld>
+  <p:clrMapOvr>
+    <a:masterClrMapping/>
+  </p:clrMapOvr>
+</p:sld>
+</file>
+
+<file path=ppt/slides/slide12.xml><?xml version="1.0" encoding="utf-8"?>
+<p:sld xmlns:a="http://schemas.openxmlformats.org/drawingml/2006/main" xmlns:r="http://schemas.openxmlformats.org/officeDocument/2006/relationships" xmlns:p="http://schemas.openxmlformats.org/presentationml/2006/main">
+  <p:cSld>
+    <p:spTree>
+      <p:nvGrpSpPr>
+        <p:cNvPr id="1" name=""/>
+        <p:cNvGrpSpPr/>
+        <p:nvPr/>
+      </p:nvGrpSpPr>
+      <p:grpSpPr>
+        <a:xfrm>
+          <a:off x="0" y="0"/>
+          <a:ext cx="0" cy="0"/>
+          <a:chOff x="0" y="0"/>
+          <a:chExt cx="0" cy="0"/>
+        </a:xfrm>
+      </p:grpSpPr>
       <p:pic>
         <p:nvPicPr>
           <p:cNvPr id="7" name="Picture 6" descr="Screen Shot 2016-11-14 at 7.24.05 PM.png"/>
@@ -4566,7 +5032,7 @@
 </p:sld>
 </file>
 
-<file path=ppt/slides/slide11.xml><?xml version="1.0" encoding="utf-8"?>
+<file path=ppt/slides/slide13.xml><?xml version="1.0" encoding="utf-8"?>
 <p:sld xmlns:a="http://schemas.openxmlformats.org/drawingml/2006/main" xmlns:r="http://schemas.openxmlformats.org/officeDocument/2006/relationships" xmlns:p="http://schemas.openxmlformats.org/presentationml/2006/main">
   <p:cSld>
     <p:spTree>
@@ -4895,7 +5361,7 @@
 </p:sld>
 </file>
 
-<file path=ppt/slides/slide12.xml><?xml version="1.0" encoding="utf-8"?>
+<file path=ppt/slides/slide14.xml><?xml version="1.0" encoding="utf-8"?>
 <p:sld xmlns:a="http://schemas.openxmlformats.org/drawingml/2006/main" xmlns:r="http://schemas.openxmlformats.org/officeDocument/2006/relationships" xmlns:p="http://schemas.openxmlformats.org/presentationml/2006/main">
   <p:cSld>
     <p:spTree>
@@ -5091,7 +5557,7 @@
 </p:sld>
 </file>
 
-<file path=ppt/slides/slide13.xml><?xml version="1.0" encoding="utf-8"?>
+<file path=ppt/slides/slide15.xml><?xml version="1.0" encoding="utf-8"?>
 <p:sld xmlns:a="http://schemas.openxmlformats.org/drawingml/2006/main" xmlns:r="http://schemas.openxmlformats.org/officeDocument/2006/relationships" xmlns:p="http://schemas.openxmlformats.org/presentationml/2006/main">
   <p:cSld>
     <p:spTree>
@@ -5290,7 +5756,7 @@
 </p:sld>
 </file>
 
-<file path=ppt/slides/slide14.xml><?xml version="1.0" encoding="utf-8"?>
+<file path=ppt/slides/slide16.xml><?xml version="1.0" encoding="utf-8"?>
 <p:sld xmlns:a="http://schemas.openxmlformats.org/drawingml/2006/main" xmlns:r="http://schemas.openxmlformats.org/officeDocument/2006/relationships" xmlns:p="http://schemas.openxmlformats.org/presentationml/2006/main">
   <p:cSld>
     <p:spTree>
@@ -5385,7 +5851,7 @@
 </p:sld>
 </file>
 
-<file path=ppt/slides/slide15.xml><?xml version="1.0" encoding="utf-8"?>
+<file path=ppt/slides/slide17.xml><?xml version="1.0" encoding="utf-8"?>
 <p:sld xmlns:a="http://schemas.openxmlformats.org/drawingml/2006/main" xmlns:r="http://schemas.openxmlformats.org/officeDocument/2006/relationships" xmlns:p="http://schemas.openxmlformats.org/presentationml/2006/main">
   <p:cSld>
     <p:spTree>
@@ -5578,7 +6044,7 @@
 </p:sld>
 </file>
 
-<file path=ppt/slides/slide16.xml><?xml version="1.0" encoding="utf-8"?>
+<file path=ppt/slides/slide18.xml><?xml version="1.0" encoding="utf-8"?>
 <p:sld xmlns:a="http://schemas.openxmlformats.org/drawingml/2006/main" xmlns:r="http://schemas.openxmlformats.org/officeDocument/2006/relationships" xmlns:p="http://schemas.openxmlformats.org/presentationml/2006/main">
   <p:cSld>
     <p:spTree>
@@ -5878,7 +6344,7 @@
 </p:sld>
 </file>
 
-<file path=ppt/slides/slide17.xml><?xml version="1.0" encoding="utf-8"?>
+<file path=ppt/slides/slide19.xml><?xml version="1.0" encoding="utf-8"?>
 <p:sld xmlns:a="http://schemas.openxmlformats.org/drawingml/2006/main" xmlns:r="http://schemas.openxmlformats.org/officeDocument/2006/relationships" xmlns:p="http://schemas.openxmlformats.org/presentationml/2006/main">
   <p:cSld>
     <p:spTree>
@@ -6000,58 +6466,16 @@
                 <a:latin typeface="Calibri" charset="0"/>
                 <a:ea typeface="ＭＳ Ｐゴシック" charset="0"/>
               </a:rPr>
-              <a:t> or </a:t>
-            </a:r>
+              <a:t> or other alternatives can be fed into many analysis pipelines</a:t>
+            </a:r>
+          </a:p>
+          <a:p>
             <a:r>
               <a:rPr lang="en-US" dirty="0" smtClean="0">
                 <a:latin typeface="Calibri" charset="0"/>
                 <a:ea typeface="ＭＳ Ｐゴシック" charset="0"/>
               </a:rPr>
-              <a:t>other </a:t>
-            </a:r>
-            <a:r>
-              <a:rPr lang="en-US" dirty="0" smtClean="0">
-                <a:latin typeface="Calibri" charset="0"/>
-                <a:ea typeface="ＭＳ Ｐゴシック" charset="0"/>
-              </a:rPr>
-              <a:t>alternatives </a:t>
-            </a:r>
-            <a:r>
-              <a:rPr lang="en-US" dirty="0" smtClean="0">
-                <a:latin typeface="Calibri" charset="0"/>
-                <a:ea typeface="ＭＳ Ｐゴシック" charset="0"/>
-              </a:rPr>
-              <a:t>can be fed into many analysis pipelines</a:t>
-            </a:r>
-          </a:p>
-          <a:p>
-            <a:r>
-              <a:rPr lang="en-US" dirty="0" smtClean="0">
-                <a:latin typeface="Calibri" charset="0"/>
-                <a:ea typeface="ＭＳ Ｐゴシック" charset="0"/>
-              </a:rPr>
-              <a:t>See supplemental R tutorial for how to format </a:t>
-            </a:r>
-            <a:r>
-              <a:rPr lang="en-US" dirty="0" smtClean="0">
-                <a:latin typeface="Calibri" charset="0"/>
-                <a:ea typeface="ＭＳ Ｐゴシック" charset="0"/>
-              </a:rPr>
-              <a:t>expression </a:t>
-            </a:r>
-            <a:r>
-              <a:rPr lang="en-US" dirty="0" smtClean="0">
-                <a:latin typeface="Calibri" charset="0"/>
-                <a:ea typeface="ＭＳ Ｐゴシック" charset="0"/>
-              </a:rPr>
-              <a:t>data </a:t>
-            </a:r>
-            <a:r>
-              <a:rPr lang="en-US" dirty="0" smtClean="0">
-                <a:latin typeface="Calibri" charset="0"/>
-                <a:ea typeface="ＭＳ Ｐゴシック" charset="0"/>
-              </a:rPr>
-              <a:t>and start manipulating in R</a:t>
+              <a:t>See supplemental R tutorial for how to format expression data and start manipulating in R</a:t>
             </a:r>
             <a:endParaRPr lang="en-US" dirty="0">
               <a:latin typeface="Calibri" charset="0"/>
@@ -6327,7 +6751,587 @@
 </p:sld>
 </file>
 
-<file path=ppt/slides/slide18.xml><?xml version="1.0" encoding="utf-8"?>
+<file path=ppt/slides/slide2.xml><?xml version="1.0" encoding="utf-8"?>
+<p:sld xmlns:a="http://schemas.openxmlformats.org/drawingml/2006/main" xmlns:r="http://schemas.openxmlformats.org/officeDocument/2006/relationships" xmlns:p="http://schemas.openxmlformats.org/presentationml/2006/main">
+  <p:cSld>
+    <p:spTree>
+      <p:nvGrpSpPr>
+        <p:cNvPr id="1" name=""/>
+        <p:cNvGrpSpPr/>
+        <p:nvPr/>
+      </p:nvGrpSpPr>
+      <p:grpSpPr>
+        <a:xfrm>
+          <a:off x="0" y="0"/>
+          <a:ext cx="0" cy="0"/>
+          <a:chOff x="0" y="0"/>
+          <a:chExt cx="0" cy="0"/>
+        </a:xfrm>
+      </p:grpSpPr>
+      <p:sp>
+        <p:nvSpPr>
+          <p:cNvPr id="57" name="Rectangle 56"/>
+          <p:cNvSpPr/>
+          <p:nvPr/>
+        </p:nvSpPr>
+        <p:spPr>
+          <a:xfrm>
+            <a:off x="0" y="2514600"/>
+            <a:ext cx="6172200" cy="4343400"/>
+          </a:xfrm>
+          <a:prstGeom prst="rect">
+            <a:avLst/>
+          </a:prstGeom>
+          <a:solidFill>
+            <a:schemeClr val="accent1">
+              <a:alpha val="18000"/>
+            </a:schemeClr>
+          </a:solidFill>
+          <a:ln>
+            <a:noFill/>
+          </a:ln>
+        </p:spPr>
+        <p:style>
+          <a:lnRef idx="1">
+            <a:schemeClr val="accent1"/>
+          </a:lnRef>
+          <a:fillRef idx="3">
+            <a:schemeClr val="accent1"/>
+          </a:fillRef>
+          <a:effectRef idx="2">
+            <a:schemeClr val="accent1"/>
+          </a:effectRef>
+          <a:fontRef idx="minor">
+            <a:schemeClr val="lt1"/>
+          </a:fontRef>
+        </p:style>
+        <p:txBody>
+          <a:bodyPr anchor="ctr"/>
+          <a:lstStyle/>
+          <a:p>
+            <a:pPr algn="ctr">
+              <a:defRPr/>
+            </a:pPr>
+            <a:endParaRPr lang="en-US" sz="1800">
+              <a:solidFill>
+                <a:srgbClr val="FFFFFF"/>
+              </a:solidFill>
+              <a:latin typeface="Calibri" charset="0"/>
+              <a:ea typeface="ＭＳ Ｐゴシック" charset="0"/>
+              <a:cs typeface="Calibri" charset="0"/>
+            </a:endParaRPr>
+          </a:p>
+        </p:txBody>
+      </p:sp>
+      <p:pic>
+        <p:nvPicPr>
+          <p:cNvPr id="10242" name="Picture 4" descr="TGI_logo_V_2color_bevel.tiff"/>
+          <p:cNvPicPr>
+            <a:picLocks noChangeAspect="1"/>
+          </p:cNvPicPr>
+          <p:nvPr/>
+        </p:nvPicPr>
+        <p:blipFill>
+          <a:blip r:embed="rId2">
+            <a:extLst>
+              <a:ext uri="{28A0092B-C50C-407E-A947-70E740481C1C}">
+                <a14:useLocalDpi xmlns:a14="http://schemas.microsoft.com/office/drawing/2010/main" val="0"/>
+              </a:ext>
+            </a:extLst>
+          </a:blip>
+          <a:srcRect l="31865" t="30911" r="32492" b="27831"/>
+          <a:stretch>
+            <a:fillRect/>
+          </a:stretch>
+        </p:blipFill>
+        <p:spPr bwMode="auto">
+          <a:xfrm>
+            <a:off x="6588125" y="3744913"/>
+            <a:ext cx="2181225" cy="1893887"/>
+          </a:xfrm>
+          <a:prstGeom prst="rect">
+            <a:avLst/>
+          </a:prstGeom>
+          <a:noFill/>
+          <a:ln>
+            <a:noFill/>
+          </a:ln>
+          <a:extLst>
+            <a:ext uri="{909E8E84-426E-40dd-AFC4-6F175D3DCCD1}">
+              <a14:hiddenFill xmlns:a14="http://schemas.microsoft.com/office/drawing/2010/main">
+                <a:solidFill>
+                  <a:srgbClr val="FFFFFF"/>
+                </a:solidFill>
+              </a14:hiddenFill>
+            </a:ext>
+            <a:ext uri="{91240B29-F687-4f45-9708-019B960494DF}">
+              <a14:hiddenLine xmlns:a14="http://schemas.microsoft.com/office/drawing/2010/main" w="9525">
+                <a:solidFill>
+                  <a:srgbClr val="000000"/>
+                </a:solidFill>
+                <a:miter lim="800000"/>
+                <a:headEnd/>
+                <a:tailEnd/>
+              </a14:hiddenLine>
+            </a:ext>
+          </a:extLst>
+        </p:spPr>
+      </p:pic>
+      <p:pic>
+        <p:nvPicPr>
+          <p:cNvPr id="10243" name="Picture 1" descr="RNA-Seq-alignment.png"/>
+          <p:cNvPicPr>
+            <a:picLocks noChangeAspect="1"/>
+          </p:cNvPicPr>
+          <p:nvPr/>
+        </p:nvPicPr>
+        <p:blipFill>
+          <a:blip r:embed="rId3">
+            <a:extLst>
+              <a:ext uri="{28A0092B-C50C-407E-A947-70E740481C1C}">
+                <a14:useLocalDpi xmlns:a14="http://schemas.microsoft.com/office/drawing/2010/main" val="0"/>
+              </a:ext>
+            </a:extLst>
+          </a:blip>
+          <a:srcRect/>
+          <a:stretch>
+            <a:fillRect/>
+          </a:stretch>
+        </p:blipFill>
+        <p:spPr bwMode="auto">
+          <a:xfrm>
+            <a:off x="900113" y="2636838"/>
+            <a:ext cx="4248150" cy="4068762"/>
+          </a:xfrm>
+          <a:prstGeom prst="rect">
+            <a:avLst/>
+          </a:prstGeom>
+          <a:noFill/>
+          <a:ln>
+            <a:noFill/>
+          </a:ln>
+          <a:extLst>
+            <a:ext uri="{909E8E84-426E-40dd-AFC4-6F175D3DCCD1}">
+              <a14:hiddenFill xmlns:a14="http://schemas.microsoft.com/office/drawing/2010/main">
+                <a:solidFill>
+                  <a:srgbClr val="FFFFFF"/>
+                </a:solidFill>
+              </a14:hiddenFill>
+            </a:ext>
+            <a:ext uri="{91240B29-F687-4f45-9708-019B960494DF}">
+              <a14:hiddenLine xmlns:a14="http://schemas.microsoft.com/office/drawing/2010/main" w="9525">
+                <a:solidFill>
+                  <a:srgbClr val="000000"/>
+                </a:solidFill>
+                <a:miter lim="800000"/>
+                <a:headEnd/>
+                <a:tailEnd/>
+              </a14:hiddenLine>
+            </a:ext>
+          </a:extLst>
+        </p:spPr>
+      </p:pic>
+      <p:sp>
+        <p:nvSpPr>
+          <p:cNvPr id="10244" name="Title 1"/>
+          <p:cNvSpPr txBox="1">
+            <a:spLocks/>
+          </p:cNvSpPr>
+          <p:nvPr/>
+        </p:nvSpPr>
+        <p:spPr bwMode="auto">
+          <a:xfrm>
+            <a:off x="2943225" y="365125"/>
+            <a:ext cx="6019800" cy="838200"/>
+          </a:xfrm>
+          <a:prstGeom prst="rect">
+            <a:avLst/>
+          </a:prstGeom>
+          <a:noFill/>
+          <a:ln>
+            <a:noFill/>
+          </a:ln>
+          <a:extLst>
+            <a:ext uri="{909E8E84-426E-40dd-AFC4-6F175D3DCCD1}">
+              <a14:hiddenFill xmlns:a14="http://schemas.microsoft.com/office/drawing/2010/main">
+                <a:solidFill>
+                  <a:srgbClr val="FFFFFF"/>
+                </a:solidFill>
+              </a14:hiddenFill>
+            </a:ext>
+            <a:ext uri="{91240B29-F687-4f45-9708-019B960494DF}">
+              <a14:hiddenLine xmlns:a14="http://schemas.microsoft.com/office/drawing/2010/main" w="9525">
+                <a:solidFill>
+                  <a:srgbClr val="000000"/>
+                </a:solidFill>
+                <a:miter lim="800000"/>
+                <a:headEnd/>
+                <a:tailEnd/>
+              </a14:hiddenLine>
+            </a:ext>
+          </a:extLst>
+        </p:spPr>
+        <p:txBody>
+          <a:bodyPr anchor="ctr"/>
+          <a:lstStyle>
+            <a:lvl1pPr eaLnBrk="0" hangingPunct="0">
+              <a:defRPr sz="2400">
+                <a:solidFill>
+                  <a:schemeClr val="tx1"/>
+                </a:solidFill>
+                <a:latin typeface="Arial" charset="0"/>
+                <a:ea typeface="ＭＳ Ｐゴシック" charset="0"/>
+                <a:cs typeface="ＭＳ Ｐゴシック" charset="0"/>
+              </a:defRPr>
+            </a:lvl1pPr>
+            <a:lvl2pPr marL="742950" indent="-285750" eaLnBrk="0" hangingPunct="0">
+              <a:defRPr sz="2400">
+                <a:solidFill>
+                  <a:schemeClr val="tx1"/>
+                </a:solidFill>
+                <a:latin typeface="Arial" charset="0"/>
+                <a:ea typeface="ＭＳ Ｐゴシック" charset="0"/>
+              </a:defRPr>
+            </a:lvl2pPr>
+            <a:lvl3pPr marL="1143000" indent="-228600" eaLnBrk="0" hangingPunct="0">
+              <a:defRPr sz="2400">
+                <a:solidFill>
+                  <a:schemeClr val="tx1"/>
+                </a:solidFill>
+                <a:latin typeface="Arial" charset="0"/>
+                <a:ea typeface="ＭＳ Ｐゴシック" charset="0"/>
+              </a:defRPr>
+            </a:lvl3pPr>
+            <a:lvl4pPr marL="1600200" indent="-228600" eaLnBrk="0" hangingPunct="0">
+              <a:defRPr sz="2400">
+                <a:solidFill>
+                  <a:schemeClr val="tx1"/>
+                </a:solidFill>
+                <a:latin typeface="Arial" charset="0"/>
+                <a:ea typeface="ＭＳ Ｐゴシック" charset="0"/>
+              </a:defRPr>
+            </a:lvl4pPr>
+            <a:lvl5pPr marL="2057400" indent="-228600" eaLnBrk="0" hangingPunct="0">
+              <a:defRPr sz="2400">
+                <a:solidFill>
+                  <a:schemeClr val="tx1"/>
+                </a:solidFill>
+                <a:latin typeface="Arial" charset="0"/>
+                <a:ea typeface="ＭＳ Ｐゴシック" charset="0"/>
+              </a:defRPr>
+            </a:lvl5pPr>
+            <a:lvl6pPr marL="2514600" indent="-228600" eaLnBrk="0" fontAlgn="base" hangingPunct="0">
+              <a:spcBef>
+                <a:spcPct val="0"/>
+              </a:spcBef>
+              <a:spcAft>
+                <a:spcPct val="0"/>
+              </a:spcAft>
+              <a:defRPr sz="2400">
+                <a:solidFill>
+                  <a:schemeClr val="tx1"/>
+                </a:solidFill>
+                <a:latin typeface="Arial" charset="0"/>
+                <a:ea typeface="ＭＳ Ｐゴシック" charset="0"/>
+              </a:defRPr>
+            </a:lvl6pPr>
+            <a:lvl7pPr marL="2971800" indent="-228600" eaLnBrk="0" fontAlgn="base" hangingPunct="0">
+              <a:spcBef>
+                <a:spcPct val="0"/>
+              </a:spcBef>
+              <a:spcAft>
+                <a:spcPct val="0"/>
+              </a:spcAft>
+              <a:defRPr sz="2400">
+                <a:solidFill>
+                  <a:schemeClr val="tx1"/>
+                </a:solidFill>
+                <a:latin typeface="Arial" charset="0"/>
+                <a:ea typeface="ＭＳ Ｐゴシック" charset="0"/>
+              </a:defRPr>
+            </a:lvl7pPr>
+            <a:lvl8pPr marL="3429000" indent="-228600" eaLnBrk="0" fontAlgn="base" hangingPunct="0">
+              <a:spcBef>
+                <a:spcPct val="0"/>
+              </a:spcBef>
+              <a:spcAft>
+                <a:spcPct val="0"/>
+              </a:spcAft>
+              <a:defRPr sz="2400">
+                <a:solidFill>
+                  <a:schemeClr val="tx1"/>
+                </a:solidFill>
+                <a:latin typeface="Arial" charset="0"/>
+                <a:ea typeface="ＭＳ Ｐゴシック" charset="0"/>
+              </a:defRPr>
+            </a:lvl8pPr>
+            <a:lvl9pPr marL="3886200" indent="-228600" eaLnBrk="0" fontAlgn="base" hangingPunct="0">
+              <a:spcBef>
+                <a:spcPct val="0"/>
+              </a:spcBef>
+              <a:spcAft>
+                <a:spcPct val="0"/>
+              </a:spcAft>
+              <a:defRPr sz="2400">
+                <a:solidFill>
+                  <a:schemeClr val="tx1"/>
+                </a:solidFill>
+                <a:latin typeface="Arial" charset="0"/>
+                <a:ea typeface="ＭＳ Ｐゴシック" charset="0"/>
+              </a:defRPr>
+            </a:lvl9pPr>
+          </a:lstStyle>
+          <a:p>
+            <a:pPr algn="r" eaLnBrk="1" hangingPunct="1"/>
+            <a:r>
+              <a:rPr lang="en-US" sz="2000" dirty="0" smtClean="0">
+                <a:solidFill>
+                  <a:schemeClr val="bg1"/>
+                </a:solidFill>
+                <a:latin typeface="Calibri" charset="0"/>
+                <a:cs typeface="Segoe UI" charset="0"/>
+              </a:rPr>
+              <a:t>RNA-</a:t>
+            </a:r>
+            <a:r>
+              <a:rPr lang="en-US" sz="2000" dirty="0" err="1">
+                <a:solidFill>
+                  <a:schemeClr val="bg1"/>
+                </a:solidFill>
+                <a:latin typeface="Calibri" charset="0"/>
+                <a:cs typeface="Segoe UI" charset="0"/>
+              </a:rPr>
+              <a:t>S</a:t>
+            </a:r>
+            <a:r>
+              <a:rPr lang="en-US" sz="2000" dirty="0" err="1" smtClean="0">
+                <a:solidFill>
+                  <a:schemeClr val="bg1"/>
+                </a:solidFill>
+                <a:latin typeface="Calibri" charset="0"/>
+                <a:cs typeface="Segoe UI" charset="0"/>
+              </a:rPr>
+              <a:t>eq</a:t>
+            </a:r>
+            <a:r>
+              <a:rPr lang="en-US" sz="2000" dirty="0" smtClean="0">
+                <a:solidFill>
+                  <a:schemeClr val="bg1"/>
+                </a:solidFill>
+                <a:latin typeface="Calibri" charset="0"/>
+                <a:cs typeface="Segoe UI" charset="0"/>
+              </a:rPr>
+              <a:t> Module </a:t>
+            </a:r>
+            <a:r>
+              <a:rPr lang="en-US" sz="2000" dirty="0">
+                <a:solidFill>
+                  <a:schemeClr val="bg1"/>
+                </a:solidFill>
+                <a:latin typeface="Calibri" charset="0"/>
+                <a:cs typeface="Segoe UI" charset="0"/>
+              </a:rPr>
+              <a:t>3</a:t>
+            </a:r>
+            <a:br>
+              <a:rPr lang="en-US" sz="2000" dirty="0">
+                <a:solidFill>
+                  <a:schemeClr val="bg1"/>
+                </a:solidFill>
+                <a:latin typeface="Calibri" charset="0"/>
+                <a:cs typeface="Segoe UI" charset="0"/>
+              </a:rPr>
+            </a:br>
+            <a:r>
+              <a:rPr lang="en-US" sz="2000" dirty="0" smtClean="0">
+                <a:solidFill>
+                  <a:schemeClr val="bg1"/>
+                </a:solidFill>
+                <a:latin typeface="Calibri" charset="0"/>
+                <a:cs typeface="Segoe UI" charset="0"/>
+              </a:rPr>
+              <a:t>Expression and Differential Expression </a:t>
+            </a:r>
+            <a:r>
+              <a:rPr lang="en-US" sz="2000" dirty="0">
+                <a:solidFill>
+                  <a:schemeClr val="bg1"/>
+                </a:solidFill>
+                <a:latin typeface="Calibri" charset="0"/>
+                <a:cs typeface="Segoe UI" charset="0"/>
+              </a:rPr>
+              <a:t>(lecture)</a:t>
+            </a:r>
+            <a:endParaRPr lang="en-US" sz="1800" b="1" dirty="0">
+              <a:solidFill>
+                <a:schemeClr val="bg1"/>
+              </a:solidFill>
+              <a:latin typeface="Calibri" charset="0"/>
+              <a:cs typeface="Segoe UI" charset="0"/>
+            </a:endParaRPr>
+          </a:p>
+        </p:txBody>
+      </p:sp>
+      <p:sp>
+        <p:nvSpPr>
+          <p:cNvPr id="8" name="Title 1"/>
+          <p:cNvSpPr txBox="1">
+            <a:spLocks/>
+          </p:cNvSpPr>
+          <p:nvPr/>
+        </p:nvSpPr>
+        <p:spPr>
+          <a:xfrm>
+            <a:off x="3854897" y="1412776"/>
+            <a:ext cx="5181599" cy="936104"/>
+          </a:xfrm>
+          <a:prstGeom prst="rect">
+            <a:avLst/>
+          </a:prstGeom>
+        </p:spPr>
+        <p:txBody>
+          <a:bodyPr anchor="ctr"/>
+          <a:lstStyle>
+            <a:lvl1pPr algn="r">
+              <a:defRPr sz="3200" baseline="0">
+                <a:solidFill>
+                  <a:schemeClr val="bg1"/>
+                </a:solidFill>
+                <a:latin typeface="Adobe Jenson Pro" pitchFamily="18" charset="0"/>
+              </a:defRPr>
+            </a:lvl1pPr>
+          </a:lstStyle>
+          <a:p>
+            <a:pPr fontAlgn="auto">
+              <a:spcAft>
+                <a:spcPts val="0"/>
+              </a:spcAft>
+              <a:defRPr/>
+            </a:pPr>
+            <a:r>
+              <a:rPr lang="en-US" sz="1600" dirty="0" smtClean="0">
+                <a:latin typeface="Calibri"/>
+                <a:ea typeface="+mj-ea"/>
+                <a:cs typeface="Calibri"/>
+              </a:rPr>
+              <a:t>Malachi Griffith, Obi Griffith, Jason Walker, Alex Wagner</a:t>
+            </a:r>
+          </a:p>
+          <a:p>
+            <a:pPr fontAlgn="auto">
+              <a:spcAft>
+                <a:spcPts val="0"/>
+              </a:spcAft>
+              <a:buFont typeface="Arial" pitchFamily="34" charset="0"/>
+              <a:buNone/>
+              <a:defRPr/>
+            </a:pPr>
+            <a:r>
+              <a:rPr lang="en-US" sz="1600" dirty="0">
+                <a:ln w="1270">
+                  <a:solidFill>
+                    <a:schemeClr val="tx1">
+                      <a:alpha val="38000"/>
+                    </a:schemeClr>
+                  </a:solidFill>
+                </a:ln>
+                <a:latin typeface="Calibri"/>
+                <a:cs typeface="Calibri"/>
+              </a:rPr>
+              <a:t>Advanced Sequencing Technologies &amp; Applications</a:t>
+            </a:r>
+          </a:p>
+          <a:p>
+            <a:pPr fontAlgn="auto">
+              <a:spcAft>
+                <a:spcPts val="0"/>
+              </a:spcAft>
+              <a:defRPr/>
+            </a:pPr>
+            <a:r>
+              <a:rPr lang="en-US" sz="1400" dirty="0">
+                <a:ln w="1270">
+                  <a:solidFill>
+                    <a:schemeClr val="tx1">
+                      <a:alpha val="38000"/>
+                    </a:schemeClr>
+                  </a:solidFill>
+                </a:ln>
+                <a:latin typeface="Calibri"/>
+                <a:ea typeface="+mn-ea"/>
+                <a:cs typeface="Calibri"/>
+              </a:rPr>
+              <a:t>November </a:t>
+            </a:r>
+            <a:r>
+              <a:rPr lang="en-US" sz="1400" dirty="0" smtClean="0">
+                <a:ln w="1270">
+                  <a:solidFill>
+                    <a:schemeClr val="tx1">
+                      <a:alpha val="38000"/>
+                    </a:schemeClr>
+                  </a:solidFill>
+                </a:ln>
+                <a:latin typeface="Calibri"/>
+                <a:ea typeface="+mn-ea"/>
+                <a:cs typeface="Calibri"/>
+              </a:rPr>
+              <a:t>7 </a:t>
+            </a:r>
+            <a:r>
+              <a:rPr lang="en-US" sz="1400" dirty="0">
+                <a:ln w="1270">
+                  <a:solidFill>
+                    <a:schemeClr val="tx1">
+                      <a:alpha val="38000"/>
+                    </a:schemeClr>
+                  </a:solidFill>
+                </a:ln>
+                <a:latin typeface="Calibri"/>
+                <a:ea typeface="+mn-ea"/>
+                <a:cs typeface="Calibri"/>
+              </a:rPr>
+              <a:t>- </a:t>
+            </a:r>
+            <a:r>
+              <a:rPr lang="en-US" sz="1400" dirty="0" smtClean="0">
+                <a:ln w="1270">
+                  <a:solidFill>
+                    <a:schemeClr val="tx1">
+                      <a:alpha val="38000"/>
+                    </a:schemeClr>
+                  </a:solidFill>
+                </a:ln>
+                <a:latin typeface="Calibri"/>
+                <a:ea typeface="+mn-ea"/>
+                <a:cs typeface="Calibri"/>
+              </a:rPr>
+              <a:t>20, 2016</a:t>
+            </a:r>
+          </a:p>
+        </p:txBody>
+      </p:sp>
+    </p:spTree>
+    <p:extLst>
+      <p:ext uri="{BB962C8B-B14F-4D97-AF65-F5344CB8AC3E}">
+        <p14:creationId xmlns:p14="http://schemas.microsoft.com/office/powerpoint/2010/main" val="3250606954"/>
+      </p:ext>
+    </p:extLst>
+  </p:cSld>
+  <p:clrMapOvr>
+    <a:masterClrMapping/>
+  </p:clrMapOvr>
+  <p:timing>
+    <p:tnLst>
+      <p:par>
+        <p:cTn xmlns:p14="http://schemas.microsoft.com/office/powerpoint/2010/main" id="1" dur="indefinite" restart="never" nodeType="tmRoot"/>
+      </p:par>
+    </p:tnLst>
+  </p:timing>
+</p:sld>
+</file>
+
+<file path=ppt/slides/slide20.xml><?xml version="1.0" encoding="utf-8"?>
 <p:sld xmlns:a="http://schemas.openxmlformats.org/drawingml/2006/main" xmlns:r="http://schemas.openxmlformats.org/officeDocument/2006/relationships" xmlns:p="http://schemas.openxmlformats.org/presentationml/2006/main">
   <p:cSld>
     <p:spTree>
@@ -6422,7 +7426,7 @@
 </p:sld>
 </file>
 
-<file path=ppt/slides/slide19.xml><?xml version="1.0" encoding="utf-8"?>
+<file path=ppt/slides/slide21.xml><?xml version="1.0" encoding="utf-8"?>
 <p:sld xmlns:a="http://schemas.openxmlformats.org/drawingml/2006/main" xmlns:r="http://schemas.openxmlformats.org/officeDocument/2006/relationships" xmlns:p="http://schemas.openxmlformats.org/presentationml/2006/main">
   <p:cSld>
     <p:spTree>
@@ -9021,607 +10025,7 @@
 </p:sld>
 </file>
 
-<file path=ppt/slides/slide2.xml><?xml version="1.0" encoding="utf-8"?>
-<p:sld xmlns:a="http://schemas.openxmlformats.org/drawingml/2006/main" xmlns:r="http://schemas.openxmlformats.org/officeDocument/2006/relationships" xmlns:p="http://schemas.openxmlformats.org/presentationml/2006/main">
-  <p:cSld>
-    <p:spTree>
-      <p:nvGrpSpPr>
-        <p:cNvPr id="1" name=""/>
-        <p:cNvGrpSpPr/>
-        <p:nvPr/>
-      </p:nvGrpSpPr>
-      <p:grpSpPr>
-        <a:xfrm>
-          <a:off x="0" y="0"/>
-          <a:ext cx="0" cy="0"/>
-          <a:chOff x="0" y="0"/>
-          <a:chExt cx="0" cy="0"/>
-        </a:xfrm>
-      </p:grpSpPr>
-      <p:sp>
-        <p:nvSpPr>
-          <p:cNvPr id="57" name="Rectangle 56"/>
-          <p:cNvSpPr/>
-          <p:nvPr/>
-        </p:nvSpPr>
-        <p:spPr>
-          <a:xfrm>
-            <a:off x="0" y="2514600"/>
-            <a:ext cx="6172200" cy="4343400"/>
-          </a:xfrm>
-          <a:prstGeom prst="rect">
-            <a:avLst/>
-          </a:prstGeom>
-          <a:solidFill>
-            <a:schemeClr val="accent1">
-              <a:alpha val="18000"/>
-            </a:schemeClr>
-          </a:solidFill>
-          <a:ln>
-            <a:noFill/>
-          </a:ln>
-        </p:spPr>
-        <p:style>
-          <a:lnRef idx="1">
-            <a:schemeClr val="accent1"/>
-          </a:lnRef>
-          <a:fillRef idx="3">
-            <a:schemeClr val="accent1"/>
-          </a:fillRef>
-          <a:effectRef idx="2">
-            <a:schemeClr val="accent1"/>
-          </a:effectRef>
-          <a:fontRef idx="minor">
-            <a:schemeClr val="lt1"/>
-          </a:fontRef>
-        </p:style>
-        <p:txBody>
-          <a:bodyPr anchor="ctr"/>
-          <a:lstStyle/>
-          <a:p>
-            <a:pPr algn="ctr">
-              <a:defRPr/>
-            </a:pPr>
-            <a:endParaRPr lang="en-US" sz="1800">
-              <a:solidFill>
-                <a:srgbClr val="FFFFFF"/>
-              </a:solidFill>
-              <a:latin typeface="Calibri" charset="0"/>
-              <a:ea typeface="ＭＳ Ｐゴシック" charset="0"/>
-              <a:cs typeface="Calibri" charset="0"/>
-            </a:endParaRPr>
-          </a:p>
-        </p:txBody>
-      </p:sp>
-      <p:pic>
-        <p:nvPicPr>
-          <p:cNvPr id="10242" name="Picture 4" descr="TGI_logo_V_2color_bevel.tiff"/>
-          <p:cNvPicPr>
-            <a:picLocks noChangeAspect="1"/>
-          </p:cNvPicPr>
-          <p:nvPr/>
-        </p:nvPicPr>
-        <p:blipFill>
-          <a:blip r:embed="rId2">
-            <a:extLst>
-              <a:ext uri="{28A0092B-C50C-407E-A947-70E740481C1C}">
-                <a14:useLocalDpi xmlns:a14="http://schemas.microsoft.com/office/drawing/2010/main" val="0"/>
-              </a:ext>
-            </a:extLst>
-          </a:blip>
-          <a:srcRect l="31865" t="30911" r="32492" b="27831"/>
-          <a:stretch>
-            <a:fillRect/>
-          </a:stretch>
-        </p:blipFill>
-        <p:spPr bwMode="auto">
-          <a:xfrm>
-            <a:off x="6588125" y="3744913"/>
-            <a:ext cx="2181225" cy="1893887"/>
-          </a:xfrm>
-          <a:prstGeom prst="rect">
-            <a:avLst/>
-          </a:prstGeom>
-          <a:noFill/>
-          <a:ln>
-            <a:noFill/>
-          </a:ln>
-          <a:extLst>
-            <a:ext uri="{909E8E84-426E-40dd-AFC4-6F175D3DCCD1}">
-              <a14:hiddenFill xmlns:a14="http://schemas.microsoft.com/office/drawing/2010/main">
-                <a:solidFill>
-                  <a:srgbClr val="FFFFFF"/>
-                </a:solidFill>
-              </a14:hiddenFill>
-            </a:ext>
-            <a:ext uri="{91240B29-F687-4f45-9708-019B960494DF}">
-              <a14:hiddenLine xmlns:a14="http://schemas.microsoft.com/office/drawing/2010/main" w="9525">
-                <a:solidFill>
-                  <a:srgbClr val="000000"/>
-                </a:solidFill>
-                <a:miter lim="800000"/>
-                <a:headEnd/>
-                <a:tailEnd/>
-              </a14:hiddenLine>
-            </a:ext>
-          </a:extLst>
-        </p:spPr>
-      </p:pic>
-      <p:pic>
-        <p:nvPicPr>
-          <p:cNvPr id="10243" name="Picture 1" descr="RNA-Seq-alignment.png"/>
-          <p:cNvPicPr>
-            <a:picLocks noChangeAspect="1"/>
-          </p:cNvPicPr>
-          <p:nvPr/>
-        </p:nvPicPr>
-        <p:blipFill>
-          <a:blip r:embed="rId3">
-            <a:extLst>
-              <a:ext uri="{28A0092B-C50C-407E-A947-70E740481C1C}">
-                <a14:useLocalDpi xmlns:a14="http://schemas.microsoft.com/office/drawing/2010/main" val="0"/>
-              </a:ext>
-            </a:extLst>
-          </a:blip>
-          <a:srcRect/>
-          <a:stretch>
-            <a:fillRect/>
-          </a:stretch>
-        </p:blipFill>
-        <p:spPr bwMode="auto">
-          <a:xfrm>
-            <a:off x="900113" y="2636838"/>
-            <a:ext cx="4248150" cy="4068762"/>
-          </a:xfrm>
-          <a:prstGeom prst="rect">
-            <a:avLst/>
-          </a:prstGeom>
-          <a:noFill/>
-          <a:ln>
-            <a:noFill/>
-          </a:ln>
-          <a:extLst>
-            <a:ext uri="{909E8E84-426E-40dd-AFC4-6F175D3DCCD1}">
-              <a14:hiddenFill xmlns:a14="http://schemas.microsoft.com/office/drawing/2010/main">
-                <a:solidFill>
-                  <a:srgbClr val="FFFFFF"/>
-                </a:solidFill>
-              </a14:hiddenFill>
-            </a:ext>
-            <a:ext uri="{91240B29-F687-4f45-9708-019B960494DF}">
-              <a14:hiddenLine xmlns:a14="http://schemas.microsoft.com/office/drawing/2010/main" w="9525">
-                <a:solidFill>
-                  <a:srgbClr val="000000"/>
-                </a:solidFill>
-                <a:miter lim="800000"/>
-                <a:headEnd/>
-                <a:tailEnd/>
-              </a14:hiddenLine>
-            </a:ext>
-          </a:extLst>
-        </p:spPr>
-      </p:pic>
-      <p:sp>
-        <p:nvSpPr>
-          <p:cNvPr id="10244" name="Title 1"/>
-          <p:cNvSpPr txBox="1">
-            <a:spLocks/>
-          </p:cNvSpPr>
-          <p:nvPr/>
-        </p:nvSpPr>
-        <p:spPr bwMode="auto">
-          <a:xfrm>
-            <a:off x="2943225" y="365125"/>
-            <a:ext cx="6019800" cy="838200"/>
-          </a:xfrm>
-          <a:prstGeom prst="rect">
-            <a:avLst/>
-          </a:prstGeom>
-          <a:noFill/>
-          <a:ln>
-            <a:noFill/>
-          </a:ln>
-          <a:extLst>
-            <a:ext uri="{909E8E84-426E-40dd-AFC4-6F175D3DCCD1}">
-              <a14:hiddenFill xmlns:a14="http://schemas.microsoft.com/office/drawing/2010/main">
-                <a:solidFill>
-                  <a:srgbClr val="FFFFFF"/>
-                </a:solidFill>
-              </a14:hiddenFill>
-            </a:ext>
-            <a:ext uri="{91240B29-F687-4f45-9708-019B960494DF}">
-              <a14:hiddenLine xmlns:a14="http://schemas.microsoft.com/office/drawing/2010/main" w="9525">
-                <a:solidFill>
-                  <a:srgbClr val="000000"/>
-                </a:solidFill>
-                <a:miter lim="800000"/>
-                <a:headEnd/>
-                <a:tailEnd/>
-              </a14:hiddenLine>
-            </a:ext>
-          </a:extLst>
-        </p:spPr>
-        <p:txBody>
-          <a:bodyPr anchor="ctr"/>
-          <a:lstStyle>
-            <a:lvl1pPr eaLnBrk="0" hangingPunct="0">
-              <a:defRPr sz="2400">
-                <a:solidFill>
-                  <a:schemeClr val="tx1"/>
-                </a:solidFill>
-                <a:latin typeface="Arial" charset="0"/>
-                <a:ea typeface="ＭＳ Ｐゴシック" charset="0"/>
-                <a:cs typeface="ＭＳ Ｐゴシック" charset="0"/>
-              </a:defRPr>
-            </a:lvl1pPr>
-            <a:lvl2pPr marL="742950" indent="-285750" eaLnBrk="0" hangingPunct="0">
-              <a:defRPr sz="2400">
-                <a:solidFill>
-                  <a:schemeClr val="tx1"/>
-                </a:solidFill>
-                <a:latin typeface="Arial" charset="0"/>
-                <a:ea typeface="ＭＳ Ｐゴシック" charset="0"/>
-              </a:defRPr>
-            </a:lvl2pPr>
-            <a:lvl3pPr marL="1143000" indent="-228600" eaLnBrk="0" hangingPunct="0">
-              <a:defRPr sz="2400">
-                <a:solidFill>
-                  <a:schemeClr val="tx1"/>
-                </a:solidFill>
-                <a:latin typeface="Arial" charset="0"/>
-                <a:ea typeface="ＭＳ Ｐゴシック" charset="0"/>
-              </a:defRPr>
-            </a:lvl3pPr>
-            <a:lvl4pPr marL="1600200" indent="-228600" eaLnBrk="0" hangingPunct="0">
-              <a:defRPr sz="2400">
-                <a:solidFill>
-                  <a:schemeClr val="tx1"/>
-                </a:solidFill>
-                <a:latin typeface="Arial" charset="0"/>
-                <a:ea typeface="ＭＳ Ｐゴシック" charset="0"/>
-              </a:defRPr>
-            </a:lvl4pPr>
-            <a:lvl5pPr marL="2057400" indent="-228600" eaLnBrk="0" hangingPunct="0">
-              <a:defRPr sz="2400">
-                <a:solidFill>
-                  <a:schemeClr val="tx1"/>
-                </a:solidFill>
-                <a:latin typeface="Arial" charset="0"/>
-                <a:ea typeface="ＭＳ Ｐゴシック" charset="0"/>
-              </a:defRPr>
-            </a:lvl5pPr>
-            <a:lvl6pPr marL="2514600" indent="-228600" eaLnBrk="0" fontAlgn="base" hangingPunct="0">
-              <a:spcBef>
-                <a:spcPct val="0"/>
-              </a:spcBef>
-              <a:spcAft>
-                <a:spcPct val="0"/>
-              </a:spcAft>
-              <a:defRPr sz="2400">
-                <a:solidFill>
-                  <a:schemeClr val="tx1"/>
-                </a:solidFill>
-                <a:latin typeface="Arial" charset="0"/>
-                <a:ea typeface="ＭＳ Ｐゴシック" charset="0"/>
-              </a:defRPr>
-            </a:lvl6pPr>
-            <a:lvl7pPr marL="2971800" indent="-228600" eaLnBrk="0" fontAlgn="base" hangingPunct="0">
-              <a:spcBef>
-                <a:spcPct val="0"/>
-              </a:spcBef>
-              <a:spcAft>
-                <a:spcPct val="0"/>
-              </a:spcAft>
-              <a:defRPr sz="2400">
-                <a:solidFill>
-                  <a:schemeClr val="tx1"/>
-                </a:solidFill>
-                <a:latin typeface="Arial" charset="0"/>
-                <a:ea typeface="ＭＳ Ｐゴシック" charset="0"/>
-              </a:defRPr>
-            </a:lvl7pPr>
-            <a:lvl8pPr marL="3429000" indent="-228600" eaLnBrk="0" fontAlgn="base" hangingPunct="0">
-              <a:spcBef>
-                <a:spcPct val="0"/>
-              </a:spcBef>
-              <a:spcAft>
-                <a:spcPct val="0"/>
-              </a:spcAft>
-              <a:defRPr sz="2400">
-                <a:solidFill>
-                  <a:schemeClr val="tx1"/>
-                </a:solidFill>
-                <a:latin typeface="Arial" charset="0"/>
-                <a:ea typeface="ＭＳ Ｐゴシック" charset="0"/>
-              </a:defRPr>
-            </a:lvl8pPr>
-            <a:lvl9pPr marL="3886200" indent="-228600" eaLnBrk="0" fontAlgn="base" hangingPunct="0">
-              <a:spcBef>
-                <a:spcPct val="0"/>
-              </a:spcBef>
-              <a:spcAft>
-                <a:spcPct val="0"/>
-              </a:spcAft>
-              <a:defRPr sz="2400">
-                <a:solidFill>
-                  <a:schemeClr val="tx1"/>
-                </a:solidFill>
-                <a:latin typeface="Arial" charset="0"/>
-                <a:ea typeface="ＭＳ Ｐゴシック" charset="0"/>
-              </a:defRPr>
-            </a:lvl9pPr>
-          </a:lstStyle>
-          <a:p>
-            <a:pPr algn="r" eaLnBrk="1" hangingPunct="1"/>
-            <a:r>
-              <a:rPr lang="en-US" sz="2000" dirty="0" smtClean="0">
-                <a:solidFill>
-                  <a:schemeClr val="bg1"/>
-                </a:solidFill>
-                <a:latin typeface="Calibri" charset="0"/>
-                <a:cs typeface="Segoe UI" charset="0"/>
-              </a:rPr>
-              <a:t>RNA-</a:t>
-            </a:r>
-            <a:r>
-              <a:rPr lang="en-US" sz="2000" dirty="0" err="1">
-                <a:solidFill>
-                  <a:schemeClr val="bg1"/>
-                </a:solidFill>
-                <a:latin typeface="Calibri" charset="0"/>
-                <a:cs typeface="Segoe UI" charset="0"/>
-              </a:rPr>
-              <a:t>S</a:t>
-            </a:r>
-            <a:r>
-              <a:rPr lang="en-US" sz="2000" dirty="0" err="1" smtClean="0">
-                <a:solidFill>
-                  <a:schemeClr val="bg1"/>
-                </a:solidFill>
-                <a:latin typeface="Calibri" charset="0"/>
-                <a:cs typeface="Segoe UI" charset="0"/>
-              </a:rPr>
-              <a:t>eq</a:t>
-            </a:r>
-            <a:r>
-              <a:rPr lang="en-US" sz="2000" dirty="0" smtClean="0">
-                <a:solidFill>
-                  <a:schemeClr val="bg1"/>
-                </a:solidFill>
-                <a:latin typeface="Calibri" charset="0"/>
-                <a:cs typeface="Segoe UI" charset="0"/>
-              </a:rPr>
-              <a:t> Module </a:t>
-            </a:r>
-            <a:r>
-              <a:rPr lang="en-US" sz="2000" dirty="0">
-                <a:solidFill>
-                  <a:schemeClr val="bg1"/>
-                </a:solidFill>
-                <a:latin typeface="Calibri" charset="0"/>
-                <a:cs typeface="Segoe UI" charset="0"/>
-              </a:rPr>
-              <a:t>3</a:t>
-            </a:r>
-            <a:r>
-              <a:rPr lang="en-US" sz="2000" dirty="0">
-                <a:solidFill>
-                  <a:schemeClr val="bg1"/>
-                </a:solidFill>
-                <a:latin typeface="Calibri" charset="0"/>
-                <a:cs typeface="Segoe UI" charset="0"/>
-              </a:rPr>
-              <a:t/>
-            </a:r>
-            <a:br>
-              <a:rPr lang="en-US" sz="2000" dirty="0">
-                <a:solidFill>
-                  <a:schemeClr val="bg1"/>
-                </a:solidFill>
-                <a:latin typeface="Calibri" charset="0"/>
-                <a:cs typeface="Segoe UI" charset="0"/>
-              </a:rPr>
-            </a:br>
-            <a:r>
-              <a:rPr lang="en-US" sz="2000" dirty="0" smtClean="0">
-                <a:solidFill>
-                  <a:schemeClr val="bg1"/>
-                </a:solidFill>
-                <a:latin typeface="Calibri" charset="0"/>
-                <a:cs typeface="Segoe UI" charset="0"/>
-              </a:rPr>
-              <a:t>Expression and Differential Expression</a:t>
-            </a:r>
-            <a:r>
-              <a:rPr lang="en-US" sz="2000" dirty="0" smtClean="0">
-                <a:solidFill>
-                  <a:schemeClr val="bg1"/>
-                </a:solidFill>
-                <a:latin typeface="Calibri" charset="0"/>
-                <a:cs typeface="Segoe UI" charset="0"/>
-              </a:rPr>
-              <a:t> </a:t>
-            </a:r>
-            <a:r>
-              <a:rPr lang="en-US" sz="2000" dirty="0">
-                <a:solidFill>
-                  <a:schemeClr val="bg1"/>
-                </a:solidFill>
-                <a:latin typeface="Calibri" charset="0"/>
-                <a:cs typeface="Segoe UI" charset="0"/>
-              </a:rPr>
-              <a:t>(lecture)</a:t>
-            </a:r>
-            <a:endParaRPr lang="en-US" sz="1800" b="1" dirty="0">
-              <a:solidFill>
-                <a:schemeClr val="bg1"/>
-              </a:solidFill>
-              <a:latin typeface="Calibri" charset="0"/>
-              <a:cs typeface="Segoe UI" charset="0"/>
-            </a:endParaRPr>
-          </a:p>
-        </p:txBody>
-      </p:sp>
-      <p:sp>
-        <p:nvSpPr>
-          <p:cNvPr id="8" name="Title 1"/>
-          <p:cNvSpPr txBox="1">
-            <a:spLocks/>
-          </p:cNvSpPr>
-          <p:nvPr/>
-        </p:nvSpPr>
-        <p:spPr>
-          <a:xfrm>
-            <a:off x="3854897" y="1412776"/>
-            <a:ext cx="5181599" cy="936104"/>
-          </a:xfrm>
-          <a:prstGeom prst="rect">
-            <a:avLst/>
-          </a:prstGeom>
-        </p:spPr>
-        <p:txBody>
-          <a:bodyPr anchor="ctr"/>
-          <a:lstStyle>
-            <a:lvl1pPr algn="r">
-              <a:defRPr sz="3200" baseline="0">
-                <a:solidFill>
-                  <a:schemeClr val="bg1"/>
-                </a:solidFill>
-                <a:latin typeface="Adobe Jenson Pro" pitchFamily="18" charset="0"/>
-              </a:defRPr>
-            </a:lvl1pPr>
-          </a:lstStyle>
-          <a:p>
-            <a:pPr fontAlgn="auto">
-              <a:spcAft>
-                <a:spcPts val="0"/>
-              </a:spcAft>
-              <a:defRPr/>
-            </a:pPr>
-            <a:r>
-              <a:rPr lang="en-US" sz="1600" dirty="0" smtClean="0">
-                <a:latin typeface="Calibri"/>
-                <a:ea typeface="+mj-ea"/>
-                <a:cs typeface="Calibri"/>
-              </a:rPr>
-              <a:t>Malachi Griffith, Obi Griffith, Jason Walker, Alex Wagner</a:t>
-            </a:r>
-          </a:p>
-          <a:p>
-            <a:pPr fontAlgn="auto">
-              <a:spcAft>
-                <a:spcPts val="0"/>
-              </a:spcAft>
-              <a:buFont typeface="Arial" pitchFamily="34" charset="0"/>
-              <a:buNone/>
-              <a:defRPr/>
-            </a:pPr>
-            <a:r>
-              <a:rPr lang="en-US" sz="1600" dirty="0">
-                <a:ln w="1270">
-                  <a:solidFill>
-                    <a:schemeClr val="tx1">
-                      <a:alpha val="38000"/>
-                    </a:schemeClr>
-                  </a:solidFill>
-                </a:ln>
-                <a:latin typeface="Calibri"/>
-                <a:cs typeface="Calibri"/>
-              </a:rPr>
-              <a:t>Advanced Sequencing Technologies &amp; Applications</a:t>
-            </a:r>
-          </a:p>
-          <a:p>
-            <a:pPr fontAlgn="auto">
-              <a:spcAft>
-                <a:spcPts val="0"/>
-              </a:spcAft>
-              <a:defRPr/>
-            </a:pPr>
-            <a:r>
-              <a:rPr lang="en-US" sz="1400" dirty="0">
-                <a:ln w="1270">
-                  <a:solidFill>
-                    <a:schemeClr val="tx1">
-                      <a:alpha val="38000"/>
-                    </a:schemeClr>
-                  </a:solidFill>
-                </a:ln>
-                <a:latin typeface="Calibri"/>
-                <a:ea typeface="+mn-ea"/>
-                <a:cs typeface="Calibri"/>
-              </a:rPr>
-              <a:t>November </a:t>
-            </a:r>
-            <a:r>
-              <a:rPr lang="en-US" sz="1400" dirty="0" smtClean="0">
-                <a:ln w="1270">
-                  <a:solidFill>
-                    <a:schemeClr val="tx1">
-                      <a:alpha val="38000"/>
-                    </a:schemeClr>
-                  </a:solidFill>
-                </a:ln>
-                <a:latin typeface="Calibri"/>
-                <a:ea typeface="+mn-ea"/>
-                <a:cs typeface="Calibri"/>
-              </a:rPr>
-              <a:t>7 </a:t>
-            </a:r>
-            <a:r>
-              <a:rPr lang="en-US" sz="1400" dirty="0">
-                <a:ln w="1270">
-                  <a:solidFill>
-                    <a:schemeClr val="tx1">
-                      <a:alpha val="38000"/>
-                    </a:schemeClr>
-                  </a:solidFill>
-                </a:ln>
-                <a:latin typeface="Calibri"/>
-                <a:ea typeface="+mn-ea"/>
-                <a:cs typeface="Calibri"/>
-              </a:rPr>
-              <a:t>- </a:t>
-            </a:r>
-            <a:r>
-              <a:rPr lang="en-US" sz="1400" dirty="0" smtClean="0">
-                <a:ln w="1270">
-                  <a:solidFill>
-                    <a:schemeClr val="tx1">
-                      <a:alpha val="38000"/>
-                    </a:schemeClr>
-                  </a:solidFill>
-                </a:ln>
-                <a:latin typeface="Calibri"/>
-                <a:ea typeface="+mn-ea"/>
-                <a:cs typeface="Calibri"/>
-              </a:rPr>
-              <a:t>20, 2016</a:t>
-            </a:r>
-          </a:p>
-        </p:txBody>
-      </p:sp>
-    </p:spTree>
-    <p:extLst>
-      <p:ext uri="{BB962C8B-B14F-4D97-AF65-F5344CB8AC3E}">
-        <p14:creationId xmlns:p14="http://schemas.microsoft.com/office/powerpoint/2010/main" val="3250606954"/>
-      </p:ext>
-    </p:extLst>
-  </p:cSld>
-  <p:clrMapOvr>
-    <a:masterClrMapping/>
-  </p:clrMapOvr>
-  <p:timing>
-    <p:tnLst>
-      <p:par>
-        <p:cTn xmlns:p14="http://schemas.microsoft.com/office/powerpoint/2010/main" id="1" dur="indefinite" restart="never" nodeType="tmRoot"/>
-      </p:par>
-    </p:tnLst>
-  </p:timing>
-</p:sld>
-</file>
-
-<file path=ppt/slides/slide20.xml><?xml version="1.0" encoding="utf-8"?>
+<file path=ppt/slides/slide22.xml><?xml version="1.0" encoding="utf-8"?>
 <p:sld xmlns:a="http://schemas.openxmlformats.org/drawingml/2006/main" xmlns:r="http://schemas.openxmlformats.org/officeDocument/2006/relationships" xmlns:p="http://schemas.openxmlformats.org/presentationml/2006/main">
   <p:cSld>
     <p:spTree>
@@ -10824,10 +11228,227 @@
                 <a:latin typeface="Calibri" charset="0"/>
                 <a:ea typeface="ＭＳ Ｐゴシック" charset="0"/>
               </a:rPr>
-              <a:t>FPKM (or RPKM) attempt to normalize for gene size and library depth</a:t>
-            </a:r>
-          </a:p>
-          <a:p>
+              <a:t>FPKM </a:t>
+            </a:r>
+            <a:r>
+              <a:rPr lang="en-US" dirty="0" smtClean="0">
+                <a:latin typeface="Calibri" charset="0"/>
+                <a:ea typeface="ＭＳ Ｐゴシック" charset="0"/>
+              </a:rPr>
+              <a:t>(RPKM</a:t>
+            </a:r>
+            <a:r>
+              <a:rPr lang="en-US" dirty="0" smtClean="0">
+                <a:latin typeface="Calibri" charset="0"/>
+                <a:ea typeface="ＭＳ Ｐゴシック" charset="0"/>
+              </a:rPr>
+              <a:t>) attempt to normalize for gene size and library </a:t>
+            </a:r>
+            <a:r>
+              <a:rPr lang="en-US" dirty="0" smtClean="0">
+                <a:latin typeface="Calibri" charset="0"/>
+                <a:ea typeface="ＭＳ Ｐゴシック" charset="0"/>
+              </a:rPr>
+              <a:t>depth</a:t>
+            </a:r>
+          </a:p>
+          <a:p>
+            <a:endParaRPr lang="nl-NL" dirty="0" smtClean="0">
+              <a:latin typeface="Calibri" charset="0"/>
+              <a:ea typeface="ＭＳ Ｐゴシック" charset="0"/>
+            </a:endParaRPr>
+          </a:p>
+          <a:p>
+            <a:r>
+              <a:rPr lang="nl-NL" dirty="0" smtClean="0">
+                <a:latin typeface="Calibri" charset="0"/>
+                <a:ea typeface="ＭＳ Ｐゴシック" charset="0"/>
+              </a:rPr>
+              <a:t>F</a:t>
+            </a:r>
+            <a:r>
+              <a:rPr lang="nl-NL" dirty="0" smtClean="0">
+                <a:latin typeface="Calibri" charset="0"/>
+                <a:ea typeface="ＭＳ Ｐゴシック" charset="0"/>
+              </a:rPr>
+              <a:t>PKM (RPKM</a:t>
+            </a:r>
+            <a:r>
+              <a:rPr lang="nl-NL" dirty="0" smtClean="0">
+                <a:latin typeface="Calibri" charset="0"/>
+                <a:ea typeface="ＭＳ Ｐゴシック" charset="0"/>
+              </a:rPr>
+              <a:t>) = (10</a:t>
+            </a:r>
+            <a:r>
+              <a:rPr lang="nl-NL" dirty="0">
+                <a:latin typeface="Calibri" charset="0"/>
+                <a:ea typeface="ＭＳ Ｐゴシック" charset="0"/>
+              </a:rPr>
+              <a:t>^9 * </a:t>
+            </a:r>
+            <a:r>
+              <a:rPr lang="nl-NL" dirty="0" smtClean="0">
+                <a:latin typeface="Calibri" charset="0"/>
+                <a:ea typeface="ＭＳ Ｐゴシック" charset="0"/>
+              </a:rPr>
+              <a:t>C) </a:t>
+            </a:r>
+            <a:r>
+              <a:rPr lang="nl-NL" dirty="0">
+                <a:latin typeface="Calibri" charset="0"/>
+                <a:ea typeface="ＭＳ Ｐゴシック" charset="0"/>
+              </a:rPr>
+              <a:t>/ (N * L)</a:t>
+            </a:r>
+            <a:r>
+              <a:rPr lang="en-US" dirty="0" smtClean="0">
+                <a:latin typeface="Calibri" charset="0"/>
+                <a:ea typeface="ＭＳ Ｐゴシック" charset="0"/>
+              </a:rPr>
+              <a:t> </a:t>
+            </a:r>
+          </a:p>
+          <a:p>
+            <a:pPr lvl="1"/>
+            <a:r>
+              <a:rPr lang="en-US" dirty="0" smtClean="0">
+                <a:latin typeface="Calibri" charset="0"/>
+                <a:ea typeface="ＭＳ Ｐゴシック" charset="0"/>
+              </a:rPr>
+              <a:t>C = number </a:t>
+            </a:r>
+            <a:r>
+              <a:rPr lang="en-US" dirty="0">
+                <a:latin typeface="Calibri" charset="0"/>
+                <a:ea typeface="ＭＳ Ｐゴシック" charset="0"/>
+              </a:rPr>
+              <a:t>of </a:t>
+            </a:r>
+            <a:r>
+              <a:rPr lang="en-US" dirty="0" err="1">
+                <a:latin typeface="Calibri" charset="0"/>
+                <a:ea typeface="ＭＳ Ｐゴシック" charset="0"/>
+              </a:rPr>
+              <a:t>mappable</a:t>
+            </a:r>
+            <a:r>
+              <a:rPr lang="en-US" dirty="0">
+                <a:latin typeface="Calibri" charset="0"/>
+                <a:ea typeface="ＭＳ Ｐゴシック" charset="0"/>
+              </a:rPr>
+              <a:t> </a:t>
+            </a:r>
+            <a:r>
+              <a:rPr lang="en-US" dirty="0" smtClean="0">
+                <a:latin typeface="Calibri" charset="0"/>
+                <a:ea typeface="ＭＳ Ｐゴシック" charset="0"/>
+              </a:rPr>
+              <a:t>reads/fragments for a gene/transcript/exon/</a:t>
+            </a:r>
+            <a:r>
+              <a:rPr lang="en-US" dirty="0" err="1" smtClean="0">
+                <a:latin typeface="Calibri" charset="0"/>
+                <a:ea typeface="ＭＳ Ｐゴシック" charset="0"/>
+              </a:rPr>
+              <a:t>etc</a:t>
+            </a:r>
+            <a:endParaRPr lang="en-US" dirty="0" smtClean="0">
+              <a:latin typeface="Calibri" charset="0"/>
+              <a:ea typeface="ＭＳ Ｐゴシック" charset="0"/>
+            </a:endParaRPr>
+          </a:p>
+          <a:p>
+            <a:pPr lvl="1"/>
+            <a:r>
+              <a:rPr lang="en-US" dirty="0" smtClean="0">
+                <a:latin typeface="Calibri" charset="0"/>
+                <a:ea typeface="ＭＳ Ｐゴシック" charset="0"/>
+              </a:rPr>
+              <a:t>N = </a:t>
+            </a:r>
+            <a:r>
+              <a:rPr lang="en-US" dirty="0">
+                <a:latin typeface="Calibri" charset="0"/>
+                <a:ea typeface="ＭＳ Ｐゴシック" charset="0"/>
+              </a:rPr>
+              <a:t>total number of </a:t>
+            </a:r>
+            <a:r>
+              <a:rPr lang="en-US" dirty="0" err="1">
+                <a:latin typeface="Calibri" charset="0"/>
+                <a:ea typeface="ＭＳ Ｐゴシック" charset="0"/>
+              </a:rPr>
+              <a:t>mappable</a:t>
+            </a:r>
+            <a:r>
+              <a:rPr lang="en-US" dirty="0">
+                <a:latin typeface="Calibri" charset="0"/>
+                <a:ea typeface="ＭＳ Ｐゴシック" charset="0"/>
+              </a:rPr>
+              <a:t> </a:t>
+            </a:r>
+            <a:r>
+              <a:rPr lang="en-US" dirty="0" smtClean="0">
+                <a:latin typeface="Calibri" charset="0"/>
+                <a:ea typeface="ＭＳ Ｐゴシック" charset="0"/>
+              </a:rPr>
+              <a:t>reads/fragments </a:t>
+            </a:r>
+            <a:r>
+              <a:rPr lang="en-US" dirty="0">
+                <a:latin typeface="Calibri" charset="0"/>
+                <a:ea typeface="ＭＳ Ｐゴシック" charset="0"/>
+              </a:rPr>
+              <a:t>in the </a:t>
+            </a:r>
+            <a:r>
+              <a:rPr lang="en-US" dirty="0" smtClean="0">
+                <a:latin typeface="Calibri" charset="0"/>
+                <a:ea typeface="ＭＳ Ｐゴシック" charset="0"/>
+              </a:rPr>
+              <a:t>library </a:t>
+            </a:r>
+          </a:p>
+          <a:p>
+            <a:pPr lvl="1"/>
+            <a:r>
+              <a:rPr lang="en-US" dirty="0" smtClean="0">
+                <a:latin typeface="Calibri" charset="0"/>
+                <a:ea typeface="ＭＳ Ｐゴシック" charset="0"/>
+              </a:rPr>
+              <a:t>L = </a:t>
+            </a:r>
+            <a:r>
+              <a:rPr lang="en-US" dirty="0">
+                <a:latin typeface="Calibri" charset="0"/>
+                <a:ea typeface="ＭＳ Ｐゴシック" charset="0"/>
+              </a:rPr>
+              <a:t>number of base pairs in the </a:t>
+            </a:r>
+            <a:r>
+              <a:rPr lang="en-US" dirty="0" smtClean="0">
+                <a:latin typeface="Calibri" charset="0"/>
+                <a:ea typeface="ＭＳ Ｐゴシック" charset="0"/>
+              </a:rPr>
+              <a:t>gene/transcript/exon/</a:t>
+            </a:r>
+            <a:r>
+              <a:rPr lang="en-US" dirty="0" err="1" smtClean="0">
+                <a:latin typeface="Calibri" charset="0"/>
+                <a:ea typeface="ＭＳ Ｐゴシック" charset="0"/>
+              </a:rPr>
+              <a:t>etc</a:t>
+            </a:r>
+            <a:endParaRPr lang="en-US" dirty="0" smtClean="0">
+              <a:latin typeface="Calibri" charset="0"/>
+              <a:ea typeface="ＭＳ Ｐゴシック" charset="0"/>
+            </a:endParaRPr>
+          </a:p>
+          <a:p>
+            <a:pPr marL="457200" lvl="1" indent="0">
+              <a:buNone/>
+            </a:pPr>
             <a:endParaRPr lang="en-US" dirty="0">
               <a:latin typeface="Calibri" charset="0"/>
               <a:ea typeface="ＭＳ Ｐゴシック" charset="0"/>
@@ -10835,84 +11456,20 @@
           </a:p>
           <a:p>
             <a:r>
-              <a:rPr lang="nl-NL" dirty="0" smtClean="0">
-                <a:latin typeface="Calibri" charset="0"/>
-                <a:ea typeface="ＭＳ Ｐゴシック" charset="0"/>
-              </a:rPr>
-              <a:t>RPKM (or FPKM) = (10</a:t>
-            </a:r>
-            <a:r>
-              <a:rPr lang="nl-NL" dirty="0">
-                <a:latin typeface="Calibri" charset="0"/>
-                <a:ea typeface="ＭＳ Ｐゴシック" charset="0"/>
-              </a:rPr>
-              <a:t>^9 * </a:t>
-            </a:r>
-            <a:r>
-              <a:rPr lang="nl-NL" dirty="0" smtClean="0">
-                <a:latin typeface="Calibri" charset="0"/>
-                <a:ea typeface="ＭＳ Ｐゴシック" charset="0"/>
-              </a:rPr>
-              <a:t>C) </a:t>
-            </a:r>
-            <a:r>
-              <a:rPr lang="nl-NL" dirty="0">
-                <a:latin typeface="Calibri" charset="0"/>
-                <a:ea typeface="ＭＳ Ｐゴシック" charset="0"/>
-              </a:rPr>
-              <a:t>/ (N * L)</a:t>
+              <a:rPr lang="en-US" dirty="0">
+                <a:latin typeface="Calibri" charset="0"/>
+                <a:ea typeface="ＭＳ Ｐゴシック" charset="0"/>
+                <a:hlinkClick r:id="rId3"/>
+              </a:rPr>
+              <a:t>http://www.biostars.org/p/11378</a:t>
             </a:r>
             <a:r>
               <a:rPr lang="en-US" dirty="0" smtClean="0">
                 <a:latin typeface="Calibri" charset="0"/>
                 <a:ea typeface="ＭＳ Ｐゴシック" charset="0"/>
-              </a:rPr>
-              <a:t> </a:t>
-            </a:r>
-          </a:p>
-          <a:p>
-            <a:pPr lvl="1"/>
-            <a:r>
-              <a:rPr lang="en-US" dirty="0" smtClean="0">
-                <a:latin typeface="Calibri" charset="0"/>
-                <a:ea typeface="ＭＳ Ｐゴシック" charset="0"/>
-              </a:rPr>
-              <a:t>C = number </a:t>
-            </a:r>
-            <a:r>
-              <a:rPr lang="en-US" dirty="0">
-                <a:latin typeface="Calibri" charset="0"/>
-                <a:ea typeface="ＭＳ Ｐゴシック" charset="0"/>
-              </a:rPr>
-              <a:t>of </a:t>
-            </a:r>
-            <a:r>
-              <a:rPr lang="en-US" dirty="0" err="1">
-                <a:latin typeface="Calibri" charset="0"/>
-                <a:ea typeface="ＭＳ Ｐゴシック" charset="0"/>
-              </a:rPr>
-              <a:t>mappable</a:t>
-            </a:r>
-            <a:r>
-              <a:rPr lang="en-US" dirty="0">
-                <a:latin typeface="Calibri" charset="0"/>
-                <a:ea typeface="ＭＳ Ｐゴシック" charset="0"/>
-              </a:rPr>
-              <a:t> </a:t>
-            </a:r>
-            <a:r>
-              <a:rPr lang="en-US" dirty="0" smtClean="0">
-                <a:latin typeface="Calibri" charset="0"/>
-                <a:ea typeface="ＭＳ Ｐゴシック" charset="0"/>
-              </a:rPr>
-              <a:t>reads/fragments for a gene/transcript/exon/</a:t>
-            </a:r>
-            <a:r>
-              <a:rPr lang="en-US" dirty="0" err="1" smtClean="0">
-                <a:latin typeface="Calibri" charset="0"/>
-                <a:ea typeface="ＭＳ Ｐゴシック" charset="0"/>
-              </a:rPr>
-              <a:t>etc</a:t>
+                <a:hlinkClick r:id="rId3"/>
+              </a:rPr>
+              <a:t>/</a:t>
             </a:r>
             <a:endParaRPr lang="en-US" dirty="0" smtClean="0">
               <a:latin typeface="Calibri" charset="0"/>
@@ -10920,143 +11477,22 @@
             </a:endParaRPr>
           </a:p>
           <a:p>
-            <a:pPr lvl="1"/>
+            <a:r>
+              <a:rPr lang="en-US" dirty="0">
+                <a:latin typeface="Calibri" charset="0"/>
+                <a:ea typeface="ＭＳ Ｐゴシック" charset="0"/>
+                <a:hlinkClick r:id="rId4"/>
+              </a:rPr>
+              <a:t>http://www.biostars.org/p/68126</a:t>
+            </a:r>
             <a:r>
               <a:rPr lang="en-US" dirty="0" smtClean="0">
                 <a:latin typeface="Calibri" charset="0"/>
                 <a:ea typeface="ＭＳ Ｐゴシック" charset="0"/>
-              </a:rPr>
-              <a:t>N = </a:t>
-            </a:r>
-            <a:r>
-              <a:rPr lang="en-US" dirty="0">
-                <a:latin typeface="Calibri" charset="0"/>
-                <a:ea typeface="ＭＳ Ｐゴシック" charset="0"/>
-              </a:rPr>
-              <a:t>total number of </a:t>
-            </a:r>
-            <a:r>
-              <a:rPr lang="en-US" dirty="0" err="1">
-                <a:latin typeface="Calibri" charset="0"/>
-                <a:ea typeface="ＭＳ Ｐゴシック" charset="0"/>
-              </a:rPr>
-              <a:t>mappable</a:t>
-            </a:r>
-            <a:r>
-              <a:rPr lang="en-US" dirty="0">
-                <a:latin typeface="Calibri" charset="0"/>
-                <a:ea typeface="ＭＳ Ｐゴシック" charset="0"/>
-              </a:rPr>
-              <a:t> </a:t>
-            </a:r>
-            <a:r>
-              <a:rPr lang="en-US" dirty="0" smtClean="0">
-                <a:latin typeface="Calibri" charset="0"/>
-                <a:ea typeface="ＭＳ Ｐゴシック" charset="0"/>
-              </a:rPr>
-              <a:t>reads/fragments </a:t>
-            </a:r>
-            <a:r>
-              <a:rPr lang="en-US" dirty="0">
-                <a:latin typeface="Calibri" charset="0"/>
-                <a:ea typeface="ＭＳ Ｐゴシック" charset="0"/>
-              </a:rPr>
-              <a:t>in the </a:t>
-            </a:r>
-            <a:r>
-              <a:rPr lang="en-US" dirty="0" smtClean="0">
-                <a:latin typeface="Calibri" charset="0"/>
-                <a:ea typeface="ＭＳ Ｐゴシック" charset="0"/>
-              </a:rPr>
-              <a:t>library </a:t>
-            </a:r>
-          </a:p>
-          <a:p>
-            <a:pPr lvl="1"/>
-            <a:r>
-              <a:rPr lang="en-US" dirty="0" smtClean="0">
-                <a:latin typeface="Calibri" charset="0"/>
-                <a:ea typeface="ＭＳ Ｐゴシック" charset="0"/>
-              </a:rPr>
-              <a:t>L = </a:t>
-            </a:r>
-            <a:r>
-              <a:rPr lang="en-US" dirty="0">
-                <a:latin typeface="Calibri" charset="0"/>
-                <a:ea typeface="ＭＳ Ｐゴシック" charset="0"/>
-              </a:rPr>
-              <a:t>number of base pairs in the </a:t>
-            </a:r>
-            <a:r>
-              <a:rPr lang="en-US" dirty="0" smtClean="0">
-                <a:latin typeface="Calibri" charset="0"/>
-                <a:ea typeface="ＭＳ Ｐゴシック" charset="0"/>
-              </a:rPr>
-              <a:t>gene/transcript/exon/</a:t>
-            </a:r>
-            <a:r>
-              <a:rPr lang="en-US" dirty="0" err="1" smtClean="0">
-                <a:latin typeface="Calibri" charset="0"/>
-                <a:ea typeface="ＭＳ Ｐゴシック" charset="0"/>
-              </a:rPr>
-              <a:t>etc</a:t>
-            </a:r>
-            <a:endParaRPr lang="en-US" dirty="0" smtClean="0">
-              <a:latin typeface="Calibri" charset="0"/>
-              <a:ea typeface="ＭＳ Ｐゴシック" charset="0"/>
-            </a:endParaRPr>
-          </a:p>
-          <a:p>
-            <a:endParaRPr lang="en-US" dirty="0">
-              <a:latin typeface="Calibri" charset="0"/>
-              <a:ea typeface="ＭＳ Ｐゴシック" charset="0"/>
-            </a:endParaRPr>
-          </a:p>
-          <a:p>
-            <a:r>
-              <a:rPr lang="en-US" dirty="0">
-                <a:latin typeface="Calibri" charset="0"/>
-                <a:ea typeface="ＭＳ Ｐゴシック" charset="0"/>
-                <a:hlinkClick r:id="rId3"/>
-              </a:rPr>
-              <a:t>http://www.biostars.org/p/11378</a:t>
-            </a:r>
-            <a:r>
-              <a:rPr lang="en-US" dirty="0" smtClean="0">
-                <a:latin typeface="Calibri" charset="0"/>
-                <a:ea typeface="ＭＳ Ｐゴシック" charset="0"/>
-                <a:hlinkClick r:id="rId3"/>
+                <a:hlinkClick r:id="rId4"/>
               </a:rPr>
               <a:t>/</a:t>
             </a:r>
-            <a:endParaRPr lang="en-US" dirty="0" smtClean="0">
-              <a:latin typeface="Calibri" charset="0"/>
-              <a:ea typeface="ＭＳ Ｐゴシック" charset="0"/>
-            </a:endParaRPr>
-          </a:p>
-          <a:p>
-            <a:r>
-              <a:rPr lang="en-US" dirty="0">
-                <a:latin typeface="Calibri" charset="0"/>
-                <a:ea typeface="ＭＳ Ｐゴシック" charset="0"/>
-                <a:hlinkClick r:id="rId4"/>
-              </a:rPr>
-              <a:t>http://www.biostars.org/p/68126</a:t>
-            </a:r>
-            <a:r>
-              <a:rPr lang="en-US" dirty="0" smtClean="0">
-                <a:latin typeface="Calibri" charset="0"/>
-                <a:ea typeface="ＭＳ Ｐゴシック" charset="0"/>
-                <a:hlinkClick r:id="rId4"/>
-              </a:rPr>
-              <a:t>/</a:t>
-            </a:r>
-            <a:endParaRPr lang="en-US" dirty="0" smtClean="0">
-              <a:latin typeface="Calibri" charset="0"/>
-              <a:ea typeface="ＭＳ Ｐゴシック" charset="0"/>
-            </a:endParaRPr>
-          </a:p>
-          <a:p>
             <a:endParaRPr lang="en-US" dirty="0" smtClean="0">
               <a:latin typeface="Calibri" charset="0"/>
               <a:ea typeface="ＭＳ Ｐゴシック" charset="0"/>
@@ -11091,6 +11527,267 @@
 </file>
 
 <file path=ppt/slides/slide7.xml><?xml version="1.0" encoding="utf-8"?>
+<p:sld xmlns:a="http://schemas.openxmlformats.org/drawingml/2006/main" xmlns:r="http://schemas.openxmlformats.org/officeDocument/2006/relationships" xmlns:p="http://schemas.openxmlformats.org/presentationml/2006/main">
+  <p:cSld>
+    <p:spTree>
+      <p:nvGrpSpPr>
+        <p:cNvPr id="1" name=""/>
+        <p:cNvGrpSpPr/>
+        <p:nvPr/>
+      </p:nvGrpSpPr>
+      <p:grpSpPr>
+        <a:xfrm>
+          <a:off x="0" y="0"/>
+          <a:ext cx="0" cy="0"/>
+          <a:chOff x="0" y="0"/>
+          <a:chExt cx="0" cy="0"/>
+        </a:xfrm>
+      </p:grpSpPr>
+      <p:sp>
+        <p:nvSpPr>
+          <p:cNvPr id="2" name="Title 1"/>
+          <p:cNvSpPr>
+            <a:spLocks noGrp="1"/>
+          </p:cNvSpPr>
+          <p:nvPr>
+            <p:ph type="title"/>
+          </p:nvPr>
+        </p:nvSpPr>
+        <p:spPr/>
+        <p:txBody>
+          <a:bodyPr/>
+          <a:lstStyle/>
+          <a:p>
+            <a:r>
+              <a:rPr lang="en-US" dirty="0" smtClean="0"/>
+              <a:t>How do FPKM and TPM differ?</a:t>
+            </a:r>
+            <a:endParaRPr lang="en-US" dirty="0"/>
+          </a:p>
+        </p:txBody>
+      </p:sp>
+      <p:sp>
+        <p:nvSpPr>
+          <p:cNvPr id="3" name="Content Placeholder 2"/>
+          <p:cNvSpPr>
+            <a:spLocks noGrp="1"/>
+          </p:cNvSpPr>
+          <p:nvPr>
+            <p:ph idx="1"/>
+          </p:nvPr>
+        </p:nvSpPr>
+        <p:spPr>
+          <a:xfrm>
+            <a:off x="152400" y="1124744"/>
+            <a:ext cx="8839200" cy="4724400"/>
+          </a:xfrm>
+        </p:spPr>
+        <p:txBody>
+          <a:bodyPr/>
+          <a:lstStyle/>
+          <a:p>
+            <a:r>
+              <a:rPr lang="en-US" dirty="0" smtClean="0"/>
+              <a:t>TPM: Transcript per </a:t>
+            </a:r>
+            <a:r>
+              <a:rPr lang="en-US" dirty="0" err="1" smtClean="0"/>
+              <a:t>Kilobase</a:t>
+            </a:r>
+            <a:r>
+              <a:rPr lang="en-US" dirty="0" smtClean="0"/>
+              <a:t> Million</a:t>
+            </a:r>
+          </a:p>
+          <a:p>
+            <a:r>
+              <a:rPr lang="en-US" dirty="0" smtClean="0"/>
+              <a:t>The difference is in the order of operations:</a:t>
+            </a:r>
+          </a:p>
+          <a:p>
+            <a:pPr lvl="1"/>
+            <a:r>
+              <a:rPr lang="en-US" dirty="0" smtClean="0"/>
+              <a:t>FPKM</a:t>
+            </a:r>
+          </a:p>
+          <a:p>
+            <a:pPr lvl="2"/>
+            <a:r>
+              <a:rPr lang="en-US" dirty="0" smtClean="0"/>
+              <a:t>1) Sum sample/library fragments per million</a:t>
+            </a:r>
+          </a:p>
+          <a:p>
+            <a:pPr lvl="2"/>
+            <a:r>
+              <a:rPr lang="en-US" dirty="0" smtClean="0"/>
+              <a:t>2) Divide gene/transcript fragment count by #1</a:t>
+            </a:r>
+          </a:p>
+          <a:p>
+            <a:pPr lvl="3"/>
+            <a:r>
+              <a:rPr lang="en-US" dirty="0" smtClean="0"/>
+              <a:t>fragments per million, FPM</a:t>
+            </a:r>
+          </a:p>
+          <a:p>
+            <a:pPr lvl="2"/>
+            <a:r>
+              <a:rPr lang="en-US" dirty="0" smtClean="0"/>
+              <a:t>3) Divide </a:t>
+            </a:r>
+            <a:r>
+              <a:rPr lang="en-US" dirty="0"/>
+              <a:t>F</a:t>
+            </a:r>
+            <a:r>
+              <a:rPr lang="en-US" dirty="0" smtClean="0"/>
+              <a:t>PM by length of gene in </a:t>
+            </a:r>
+            <a:r>
+              <a:rPr lang="en-US" dirty="0" err="1" smtClean="0"/>
+              <a:t>kilobases</a:t>
+            </a:r>
+            <a:r>
+              <a:rPr lang="en-US" dirty="0" smtClean="0"/>
+              <a:t> (</a:t>
+            </a:r>
+            <a:r>
+              <a:rPr lang="en-US" dirty="0"/>
+              <a:t>F</a:t>
+            </a:r>
+            <a:r>
+              <a:rPr lang="en-US" dirty="0" smtClean="0"/>
+              <a:t>PKM)</a:t>
+            </a:r>
+          </a:p>
+          <a:p>
+            <a:pPr lvl="1"/>
+            <a:r>
+              <a:rPr lang="en-US" dirty="0" smtClean="0"/>
+              <a:t>TPM</a:t>
+            </a:r>
+          </a:p>
+          <a:p>
+            <a:pPr lvl="2"/>
+            <a:r>
+              <a:rPr lang="en-US" dirty="0" smtClean="0"/>
+              <a:t>1) Divide fragment count by length of transcript</a:t>
+            </a:r>
+          </a:p>
+          <a:p>
+            <a:pPr lvl="3"/>
+            <a:r>
+              <a:rPr lang="en-US" dirty="0" smtClean="0"/>
+              <a:t>fragments per </a:t>
+            </a:r>
+            <a:r>
+              <a:rPr lang="en-US" dirty="0" err="1"/>
+              <a:t>k</a:t>
+            </a:r>
+            <a:r>
+              <a:rPr lang="en-US" dirty="0" err="1" smtClean="0"/>
+              <a:t>ilobase</a:t>
+            </a:r>
+            <a:r>
+              <a:rPr lang="en-US" dirty="0" smtClean="0"/>
+              <a:t>, FPK</a:t>
+            </a:r>
+          </a:p>
+          <a:p>
+            <a:pPr lvl="2"/>
+            <a:r>
+              <a:rPr lang="en-US" dirty="0" smtClean="0"/>
+              <a:t>2) Sum all FPK for sample/library per million</a:t>
+            </a:r>
+          </a:p>
+          <a:p>
+            <a:pPr lvl="2"/>
+            <a:r>
+              <a:rPr lang="en-US" dirty="0" smtClean="0"/>
+              <a:t>3) Divide #1 by #3 (TPM)</a:t>
+            </a:r>
+          </a:p>
+          <a:p>
+            <a:r>
+              <a:rPr lang="en-US" sz="1800" dirty="0">
+                <a:hlinkClick r:id="rId3"/>
+              </a:rPr>
+              <a:t>http://</a:t>
+            </a:r>
+            <a:r>
+              <a:rPr lang="en-US" sz="1800" dirty="0" err="1">
+                <a:hlinkClick r:id="rId3"/>
+              </a:rPr>
+              <a:t>www.rna-seqblog.com</a:t>
+            </a:r>
+            <a:r>
+              <a:rPr lang="en-US" sz="1800" dirty="0">
+                <a:hlinkClick r:id="rId3"/>
+              </a:rPr>
+              <a:t>/</a:t>
+            </a:r>
+            <a:r>
+              <a:rPr lang="en-US" sz="1800" dirty="0" err="1">
+                <a:hlinkClick r:id="rId3"/>
+              </a:rPr>
+              <a:t>rpkm</a:t>
+            </a:r>
+            <a:r>
+              <a:rPr lang="en-US" sz="1800" dirty="0">
+                <a:hlinkClick r:id="rId3"/>
+              </a:rPr>
+              <a:t>-</a:t>
+            </a:r>
+            <a:r>
+              <a:rPr lang="en-US" sz="1800" dirty="0" err="1">
+                <a:hlinkClick r:id="rId3"/>
+              </a:rPr>
+              <a:t>fpkm</a:t>
+            </a:r>
+            <a:r>
+              <a:rPr lang="en-US" sz="1800" dirty="0">
+                <a:hlinkClick r:id="rId3"/>
+              </a:rPr>
+              <a:t>-and-</a:t>
+            </a:r>
+            <a:r>
+              <a:rPr lang="en-US" sz="1800" dirty="0" err="1">
+                <a:hlinkClick r:id="rId3"/>
+              </a:rPr>
+              <a:t>tpm</a:t>
+            </a:r>
+            <a:r>
+              <a:rPr lang="en-US" sz="1800" dirty="0">
+                <a:hlinkClick r:id="rId3"/>
+              </a:rPr>
+              <a:t>-clearly-explained/</a:t>
+            </a:r>
+            <a:endParaRPr lang="en-US" sz="1800" dirty="0" smtClean="0"/>
+          </a:p>
+          <a:p>
+            <a:pPr lvl="2"/>
+            <a:endParaRPr lang="en-US" dirty="0" smtClean="0"/>
+          </a:p>
+        </p:txBody>
+      </p:sp>
+    </p:spTree>
+    <p:extLst>
+      <p:ext uri="{BB962C8B-B14F-4D97-AF65-F5344CB8AC3E}">
+        <p14:creationId xmlns:p14="http://schemas.microsoft.com/office/powerpoint/2010/main" val="3072293667"/>
+      </p:ext>
+    </p:extLst>
+  </p:cSld>
+  <p:clrMapOvr>
+    <a:masterClrMapping/>
+  </p:clrMapOvr>
+</p:sld>
+</file>
+
+<file path=ppt/slides/slide8.xml><?xml version="1.0" encoding="utf-8"?>
 <p:sld xmlns:a="http://schemas.openxmlformats.org/drawingml/2006/main" xmlns:r="http://schemas.openxmlformats.org/officeDocument/2006/relationships" xmlns:p="http://schemas.openxmlformats.org/presentationml/2006/main">
   <p:cSld>
     <p:spTree>
@@ -11219,115 +11916,48 @@
           </a:p>
         </p:txBody>
       </p:sp>
-    </p:spTree>
-    <p:extLst>
-      <p:ext uri="{BB962C8B-B14F-4D97-AF65-F5344CB8AC3E}">
-        <p14:creationId xmlns:p14="http://schemas.microsoft.com/office/powerpoint/2010/main" val="3038214154"/>
-      </p:ext>
-    </p:extLst>
-  </p:cSld>
-  <p:clrMapOvr>
-    <a:masterClrMapping/>
-  </p:clrMapOvr>
-</p:sld>
-</file>
-
-<file path=ppt/slides/slide8.xml><?xml version="1.0" encoding="utf-8"?>
-<p:sld xmlns:a="http://schemas.openxmlformats.org/drawingml/2006/main" xmlns:r="http://schemas.openxmlformats.org/officeDocument/2006/relationships" xmlns:p="http://schemas.openxmlformats.org/presentationml/2006/main">
-  <p:cSld>
-    <p:spTree>
-      <p:nvGrpSpPr>
-        <p:cNvPr id="1" name=""/>
-        <p:cNvGrpSpPr/>
-        <p:nvPr/>
-      </p:nvGrpSpPr>
-      <p:grpSpPr>
-        <a:xfrm>
-          <a:off x="0" y="0"/>
-          <a:ext cx="0" cy="0"/>
-          <a:chOff x="0" y="0"/>
-          <a:chExt cx="0" cy="0"/>
-        </a:xfrm>
-      </p:grpSpPr>
       <p:sp>
         <p:nvSpPr>
-          <p:cNvPr id="2" name="Title 1"/>
-          <p:cNvSpPr>
-            <a:spLocks noGrp="1"/>
-          </p:cNvSpPr>
-          <p:nvPr>
-            <p:ph type="title"/>
-          </p:nvPr>
+          <p:cNvPr id="3" name="TextBox 2"/>
+          <p:cNvSpPr txBox="1"/>
+          <p:nvPr/>
         </p:nvSpPr>
-        <p:spPr/>
+        <p:spPr>
+          <a:xfrm>
+            <a:off x="5292080" y="6021288"/>
+            <a:ext cx="5472608" cy="338554"/>
+          </a:xfrm>
+          <a:prstGeom prst="rect">
+            <a:avLst/>
+          </a:prstGeom>
+          <a:noFill/>
+        </p:spPr>
         <p:txBody>
-          <a:bodyPr/>
+          <a:bodyPr wrap="square" rtlCol="0">
+            <a:spAutoFit/>
+          </a:bodyPr>
           <a:lstStyle/>
           <a:p>
             <a:r>
-              <a:rPr lang="en-US" dirty="0" err="1" smtClean="0"/>
-              <a:t>StringTie</a:t>
-            </a:r>
-            <a:r>
-              <a:rPr lang="en-US" dirty="0" smtClean="0"/>
-              <a:t> –merge &amp; </a:t>
-            </a:r>
-            <a:r>
-              <a:rPr lang="en-US" dirty="0" err="1" smtClean="0"/>
-              <a:t>gffcompare</a:t>
-            </a:r>
-            <a:r>
-              <a:rPr lang="en-US" dirty="0" smtClean="0"/>
-              <a:t> for </a:t>
-            </a:r>
-            <a:endParaRPr lang="en-US" dirty="0"/>
-          </a:p>
-        </p:txBody>
-      </p:sp>
-      <p:sp>
-        <p:nvSpPr>
-          <p:cNvPr id="3" name="Content Placeholder 2"/>
-          <p:cNvSpPr>
-            <a:spLocks noGrp="1"/>
-          </p:cNvSpPr>
-          <p:nvPr>
-            <p:ph idx="1"/>
-          </p:nvPr>
-        </p:nvSpPr>
-        <p:spPr/>
-        <p:txBody>
-          <a:bodyPr/>
-          <a:lstStyle/>
-          <a:p>
-            <a:r>
-              <a:rPr lang="en-US" dirty="0" smtClean="0"/>
-              <a:t>--merge allows for the incorporation of known transcripts with assembled, potentially novel transcripts</a:t>
-            </a:r>
-          </a:p>
-          <a:p>
-            <a:r>
-              <a:rPr lang="en-US" dirty="0" err="1" smtClean="0"/>
-              <a:t>Gffcompare</a:t>
-            </a:r>
-            <a:r>
-              <a:rPr lang="en-US" dirty="0" smtClean="0"/>
-              <a:t> will compare a merged transcript GTF with known annotation, also in GTF/GFF3 format</a:t>
-            </a:r>
-          </a:p>
-          <a:p>
-            <a:pPr lvl="1"/>
-            <a:r>
-              <a:rPr lang="en-US" dirty="0" smtClean="0"/>
-              <a:t>[INSERT class codes]</a:t>
-            </a:r>
-            <a:endParaRPr lang="en-US" dirty="0"/>
+              <a:rPr lang="en-US" sz="1600" dirty="0" err="1" smtClean="0"/>
+              <a:t>Pertea</a:t>
+            </a:r>
+            <a:r>
+              <a:rPr lang="en-US" sz="1600" dirty="0"/>
+              <a:t> </a:t>
+            </a:r>
+            <a:r>
+              <a:rPr lang="en-US" sz="1600" dirty="0" smtClean="0"/>
+              <a:t>et al. Nature Biotechnology, 2015</a:t>
+            </a:r>
+            <a:endParaRPr lang="en-US" sz="1600" dirty="0"/>
           </a:p>
         </p:txBody>
       </p:sp>
     </p:spTree>
     <p:extLst>
       <p:ext uri="{BB962C8B-B14F-4D97-AF65-F5344CB8AC3E}">
-        <p14:creationId xmlns:p14="http://schemas.microsoft.com/office/powerpoint/2010/main" val="1780513396"/>
+        <p14:creationId xmlns:p14="http://schemas.microsoft.com/office/powerpoint/2010/main" val="3038214154"/>
       </p:ext>
     </p:extLst>
   </p:cSld>
@@ -11364,27 +11994,22 @@
             <p:ph type="title"/>
           </p:nvPr>
         </p:nvSpPr>
-        <p:spPr>
-          <a:xfrm>
-            <a:off x="152400" y="0"/>
-            <a:ext cx="8839200" cy="764704"/>
-          </a:xfrm>
-        </p:spPr>
+        <p:spPr/>
         <p:txBody>
           <a:bodyPr/>
           <a:lstStyle/>
           <a:p>
             <a:r>
               <a:rPr lang="en-US" dirty="0" err="1" smtClean="0"/>
-              <a:t>Ballgown</a:t>
-            </a:r>
-            <a:r>
-              <a:rPr lang="en-US" dirty="0"/>
+              <a:t>StringTie</a:t>
+            </a:r>
+            <a:r>
+              <a:rPr lang="en-US" dirty="0" smtClean="0"/>
               <a:t> </a:t>
             </a:r>
             <a:r>
               <a:rPr lang="en-US" dirty="0" smtClean="0"/>
-              <a:t>for Differential Expression</a:t>
+              <a:t>-merge</a:t>
             </a:r>
             <a:endParaRPr lang="en-US" dirty="0"/>
           </a:p>
@@ -11400,121 +12025,100 @@
             <p:ph idx="1"/>
           </p:nvPr>
         </p:nvSpPr>
-        <p:spPr>
-          <a:xfrm>
-            <a:off x="152400" y="692696"/>
-            <a:ext cx="8839200" cy="5631904"/>
-          </a:xfrm>
-        </p:spPr>
+        <p:spPr/>
         <p:txBody>
           <a:bodyPr/>
           <a:lstStyle/>
           <a:p>
             <a:r>
               <a:rPr lang="en-US" dirty="0" smtClean="0"/>
-              <a:t>Parametric </a:t>
-            </a:r>
+              <a:t>Merge together all gene structures from all samples</a:t>
+            </a:r>
+          </a:p>
+          <a:p>
+            <a:pPr lvl="1"/>
+            <a:r>
+              <a:rPr lang="en-US" dirty="0" smtClean="0"/>
+              <a:t>Some samples may only partially represent a gene structure</a:t>
+            </a:r>
+          </a:p>
+          <a:p>
             <a:r>
               <a:rPr lang="en-US" dirty="0"/>
-              <a:t>F-test comparing nested linear </a:t>
+              <a:t>A</a:t>
             </a:r>
             <a:r>
               <a:rPr lang="en-US" dirty="0" smtClean="0"/>
-              <a:t>models</a:t>
-            </a:r>
-          </a:p>
-          <a:p>
-            <a:r>
-              <a:rPr lang="en-US" dirty="0"/>
-              <a:t>Two models are fit to each feature, using expression as the </a:t>
+              <a:t>llows </a:t>
             </a:r>
             <a:r>
               <a:rPr lang="en-US" dirty="0" smtClean="0"/>
-              <a:t>outcome</a:t>
-            </a:r>
-          </a:p>
-          <a:p>
-            <a:pPr lvl="1"/>
+              <a:t>for the incorporation of known transcripts with assembled, potentially novel </a:t>
+            </a:r>
             <a:r>
               <a:rPr lang="en-US" dirty="0" smtClean="0"/>
-              <a:t>one </a:t>
-            </a:r>
-            <a:r>
-              <a:rPr lang="en-US" dirty="0"/>
-              <a:t>including the covariate of interest (e.g., case/control status or time) and one not including that covariate. </a:t>
-            </a:r>
-            <a:endParaRPr lang="en-US" dirty="0" smtClean="0"/>
+              <a:t>transcripts</a:t>
+            </a:r>
           </a:p>
           <a:p>
             <a:r>
               <a:rPr lang="en-US" dirty="0" smtClean="0"/>
-              <a:t>An </a:t>
-            </a:r>
-            <a:r>
-              <a:rPr lang="en-US" dirty="0"/>
-              <a:t>F statistic and p-value are calculated using the fits of the two models. </a:t>
-            </a:r>
-            <a:endParaRPr lang="en-US" dirty="0" smtClean="0"/>
-          </a:p>
-          <a:p>
-            <a:pPr lvl="1"/>
+              <a:t>For de novo or reference guided mode, we will rerun </a:t>
+            </a:r>
+            <a:r>
+              <a:rPr lang="en-US" dirty="0" err="1" smtClean="0"/>
+              <a:t>StringTie</a:t>
+            </a:r>
             <a:r>
               <a:rPr lang="en-US" dirty="0" smtClean="0"/>
-              <a:t>A </a:t>
-            </a:r>
-            <a:r>
-              <a:rPr lang="en-US" dirty="0"/>
-              <a:t>significant p-value means the model including the covariate of interest fits significantly better than the model without that covariate, indicating differential expression. </a:t>
-            </a:r>
-            <a:endParaRPr lang="en-US" dirty="0" smtClean="0"/>
-          </a:p>
-          <a:p>
-            <a:r>
-              <a:rPr lang="en-US" dirty="0" smtClean="0"/>
-              <a:t>We </a:t>
-            </a:r>
-            <a:r>
-              <a:rPr lang="en-US" dirty="0"/>
-              <a:t>adjust for multiple testing by reporting q-</a:t>
-            </a:r>
-            <a:r>
-              <a:rPr lang="en-US" dirty="0" smtClean="0"/>
-              <a:t>values: </a:t>
-            </a:r>
-          </a:p>
-          <a:p>
-            <a:pPr lvl="1"/>
-            <a:r>
-              <a:rPr lang="en-US" dirty="0" smtClean="0"/>
-              <a:t>q </a:t>
-            </a:r>
-            <a:r>
-              <a:rPr lang="en-US" dirty="0"/>
-              <a:t>&lt; </a:t>
-            </a:r>
-            <a:r>
-              <a:rPr lang="en-US" dirty="0" smtClean="0"/>
-              <a:t>0.05 </a:t>
-            </a:r>
-            <a:r>
-              <a:rPr lang="en-US" dirty="0"/>
-              <a:t>the false discovery rate should be controlled at ~</a:t>
-            </a:r>
-            <a:r>
-              <a:rPr lang="en-US" dirty="0" smtClean="0"/>
-              <a:t>5</a:t>
-            </a:r>
-            <a:r>
-              <a:rPr lang="en-US" dirty="0"/>
-              <a:t>%.</a:t>
-            </a:r>
+              <a:t> with the merged transcript assembly.</a:t>
+            </a:r>
+            <a:endParaRPr lang="en-US" dirty="0"/>
+          </a:p>
+        </p:txBody>
+      </p:sp>
+      <p:sp>
+        <p:nvSpPr>
+          <p:cNvPr id="4" name="TextBox 3"/>
+          <p:cNvSpPr txBox="1"/>
+          <p:nvPr/>
+        </p:nvSpPr>
+        <p:spPr>
+          <a:xfrm>
+            <a:off x="4716016" y="6021288"/>
+            <a:ext cx="4427984" cy="369332"/>
+          </a:xfrm>
+          <a:prstGeom prst="rect">
+            <a:avLst/>
+          </a:prstGeom>
+          <a:noFill/>
+        </p:spPr>
+        <p:txBody>
+          <a:bodyPr wrap="square" rtlCol="0">
+            <a:spAutoFit/>
+          </a:bodyPr>
+          <a:lstStyle/>
+          <a:p>
+            <a:r>
+              <a:rPr lang="en-US" sz="1800" dirty="0" err="1" smtClean="0"/>
+              <a:t>Pertea</a:t>
+            </a:r>
+            <a:r>
+              <a:rPr lang="en-US" sz="1800" dirty="0"/>
+              <a:t> </a:t>
+            </a:r>
+            <a:r>
+              <a:rPr lang="en-US" sz="1800" dirty="0" smtClean="0"/>
+              <a:t>et al. Nature Protocols, 2016</a:t>
+            </a:r>
+            <a:endParaRPr lang="en-US" sz="1800" dirty="0"/>
           </a:p>
         </p:txBody>
       </p:sp>
     </p:spTree>
     <p:extLst>
       <p:ext uri="{BB962C8B-B14F-4D97-AF65-F5344CB8AC3E}">
-        <p14:creationId xmlns:p14="http://schemas.microsoft.com/office/powerpoint/2010/main" val="2234681116"/>
+        <p14:creationId xmlns:p14="http://schemas.microsoft.com/office/powerpoint/2010/main" val="1780513396"/>
       </p:ext>
     </p:extLst>
   </p:cSld>

</xml_diff>